<commit_message>
altera ordem e conteúdo da apresentação
</commit_message>
<xml_diff>
--- a/Covid 19 – Data Warehouse.pptx
+++ b/Covid 19 – Data Warehouse.pptx
@@ -6,10 +6,10 @@
   </p:sldMasterIdLst>
   <p:sldIdLst>
     <p:sldId id="256" r:id="rId5"/>
-    <p:sldId id="257" r:id="rId6"/>
+    <p:sldId id="260" r:id="rId6"/>
     <p:sldId id="258" r:id="rId7"/>
-    <p:sldId id="259" r:id="rId8"/>
-    <p:sldId id="260" r:id="rId9"/>
+    <p:sldId id="257" r:id="rId8"/>
+    <p:sldId id="259" r:id="rId9"/>
     <p:sldId id="261" r:id="rId10"/>
     <p:sldId id="262" r:id="rId11"/>
     <p:sldId id="263" r:id="rId12"/>
@@ -4237,7 +4237,7 @@
           <a:p>
             <a:fld id="{8F72BA41-EC5B-4197-BCC8-0FD2E523CD7A}" type="datetimeFigureOut">
               <a:rPr lang="en-US" smtClean="0"/>
-              <a:t>5/5/2024</a:t>
+              <a:t>5/8/2024</a:t>
             </a:fld>
             <a:endParaRPr lang="en-US"/>
           </a:p>
@@ -4440,7 +4440,7 @@
           <a:p>
             <a:fld id="{8F72BA41-EC5B-4197-BCC8-0FD2E523CD7A}" type="datetimeFigureOut">
               <a:rPr lang="en-US" smtClean="0"/>
-              <a:t>5/5/2024</a:t>
+              <a:t>5/8/2024</a:t>
             </a:fld>
             <a:endParaRPr lang="en-US"/>
           </a:p>
@@ -6161,7 +6161,7 @@
           <a:p>
             <a:fld id="{8F72BA41-EC5B-4197-BCC8-0FD2E523CD7A}" type="datetimeFigureOut">
               <a:rPr lang="en-US" smtClean="0"/>
-              <a:t>5/5/2024</a:t>
+              <a:t>5/8/2024</a:t>
             </a:fld>
             <a:endParaRPr lang="en-US"/>
           </a:p>
@@ -6360,7 +6360,7 @@
           <a:p>
             <a:fld id="{8F72BA41-EC5B-4197-BCC8-0FD2E523CD7A}" type="datetimeFigureOut">
               <a:rPr lang="en-US" smtClean="0"/>
-              <a:t>5/5/2024</a:t>
+              <a:t>5/8/2024</a:t>
             </a:fld>
             <a:endParaRPr lang="en-US"/>
           </a:p>
@@ -8150,7 +8150,7 @@
           <a:p>
             <a:fld id="{8F72BA41-EC5B-4197-BCC8-0FD2E523CD7A}" type="datetimeFigureOut">
               <a:rPr lang="en-US" smtClean="0"/>
-              <a:t>5/5/2024</a:t>
+              <a:t>5/8/2024</a:t>
             </a:fld>
             <a:endParaRPr lang="en-US"/>
           </a:p>
@@ -8423,7 +8423,7 @@
           <a:p>
             <a:fld id="{8F72BA41-EC5B-4197-BCC8-0FD2E523CD7A}" type="datetimeFigureOut">
               <a:rPr lang="en-US" smtClean="0"/>
-              <a:t>5/5/2024</a:t>
+              <a:t>5/8/2024</a:t>
             </a:fld>
             <a:endParaRPr lang="en-US"/>
           </a:p>
@@ -8843,7 +8843,7 @@
           <a:p>
             <a:fld id="{8F72BA41-EC5B-4197-BCC8-0FD2E523CD7A}" type="datetimeFigureOut">
               <a:rPr lang="en-US" smtClean="0"/>
-              <a:t>5/5/2024</a:t>
+              <a:t>5/8/2024</a:t>
             </a:fld>
             <a:endParaRPr lang="en-US"/>
           </a:p>
@@ -8999,7 +8999,7 @@
           <a:p>
             <a:fld id="{8F72BA41-EC5B-4197-BCC8-0FD2E523CD7A}" type="datetimeFigureOut">
               <a:rPr lang="en-US" smtClean="0"/>
-              <a:t>5/5/2024</a:t>
+              <a:t>5/8/2024</a:t>
             </a:fld>
             <a:endParaRPr lang="en-US"/>
           </a:p>
@@ -10567,7 +10567,7 @@
           <a:p>
             <a:fld id="{8F72BA41-EC5B-4197-BCC8-0FD2E523CD7A}" type="datetimeFigureOut">
               <a:rPr lang="en-US" smtClean="0"/>
-              <a:t>5/5/2024</a:t>
+              <a:t>5/8/2024</a:t>
             </a:fld>
             <a:endParaRPr lang="en-US"/>
           </a:p>
@@ -12418,7 +12418,7 @@
           <a:p>
             <a:fld id="{8F72BA41-EC5B-4197-BCC8-0FD2E523CD7A}" type="datetimeFigureOut">
               <a:rPr lang="en-US" smtClean="0"/>
-              <a:t>5/5/2024</a:t>
+              <a:t>5/8/2024</a:t>
             </a:fld>
             <a:endParaRPr lang="en-US"/>
           </a:p>
@@ -14231,7 +14231,7 @@
           <a:p>
             <a:fld id="{8F72BA41-EC5B-4197-BCC8-0FD2E523CD7A}" type="datetimeFigureOut">
               <a:rPr lang="en-US" smtClean="0"/>
-              <a:t>5/5/2024</a:t>
+              <a:t>5/8/2024</a:t>
             </a:fld>
             <a:endParaRPr lang="en-US"/>
           </a:p>
@@ -15925,7 +15925,7 @@
             <a:fld id="{8F72BA41-EC5B-4197-BCC8-0FD2E523CD7A}" type="datetimeFigureOut">
               <a:rPr lang="en-US" smtClean="0"/>
               <a:pPr/>
-              <a:t>5/5/2024</a:t>
+              <a:t>5/8/2024</a:t>
             </a:fld>
             <a:endParaRPr lang="en-US" dirty="0"/>
           </a:p>
@@ -24859,6 +24859,14 @@
 <file path=ppt/slides/slide2.xml><?xml version="1.0" encoding="utf-8"?>
 <p:sld xmlns:a="http://schemas.openxmlformats.org/drawingml/2006/main" xmlns:r="http://schemas.openxmlformats.org/officeDocument/2006/relationships" xmlns:p="http://schemas.openxmlformats.org/presentationml/2006/main">
   <p:cSld>
+    <p:bg>
+      <p:bgPr>
+        <a:solidFill>
+          <a:schemeClr val="bg1"/>
+        </a:solidFill>
+        <a:effectLst/>
+      </p:bgPr>
+    </p:bg>
     <p:spTree>
       <p:nvGrpSpPr>
         <p:cNvPr id="1" name=""/>
@@ -24873,12 +24881,1813 @@
           <a:chExt cx="0" cy="0"/>
         </a:xfrm>
       </p:grpSpPr>
+      <p:sp useBgFill="1">
+        <p:nvSpPr>
+          <p:cNvPr id="46" name="Rectangle 8">
+            <a:extLst>
+              <a:ext uri="{FF2B5EF4-FFF2-40B4-BE49-F238E27FC236}">
+                <a16:creationId xmlns:a16="http://schemas.microsoft.com/office/drawing/2014/main" id="{1C582B07-D0F0-4B6B-A5D9-D2F192CB3A4E}"/>
+              </a:ext>
+              <a:ext uri="{C183D7F6-B498-43B3-948B-1728B52AA6E4}">
+                <adec:decorative xmlns:adec="http://schemas.microsoft.com/office/drawing/2017/decorative" val="1"/>
+              </a:ext>
+            </a:extLst>
+          </p:cNvPr>
+          <p:cNvSpPr>
+            <a:spLocks noGrp="1" noRot="1" noChangeAspect="1" noMove="1" noResize="1" noEditPoints="1" noAdjustHandles="1" noChangeArrowheads="1" noChangeShapeType="1" noTextEdit="1"/>
+          </p:cNvSpPr>
+          <p:nvPr>
+            <p:extLst>
+              <p:ext uri="{386F3935-93C4-4BCD-93E2-E3B085C9AB24}">
+                <p16:designElem xmlns:p16="http://schemas.microsoft.com/office/powerpoint/2015/main" val="1"/>
+              </p:ext>
+            </p:extLst>
+          </p:nvPr>
+        </p:nvSpPr>
+        <p:spPr>
+          <a:xfrm>
+            <a:off x="0" y="0"/>
+            <a:ext cx="12188952" cy="6858000"/>
+          </a:xfrm>
+          <a:prstGeom prst="rect">
+            <a:avLst/>
+          </a:prstGeom>
+          <a:ln>
+            <a:noFill/>
+          </a:ln>
+        </p:spPr>
+        <p:style>
+          <a:lnRef idx="2">
+            <a:schemeClr val="accent1">
+              <a:shade val="50000"/>
+            </a:schemeClr>
+          </a:lnRef>
+          <a:fillRef idx="1">
+            <a:schemeClr val="accent1"/>
+          </a:fillRef>
+          <a:effectRef idx="0">
+            <a:schemeClr val="accent1"/>
+          </a:effectRef>
+          <a:fontRef idx="minor">
+            <a:schemeClr val="lt1"/>
+          </a:fontRef>
+        </p:style>
+        <p:txBody>
+          <a:bodyPr rtlCol="0" anchor="ctr"/>
+          <a:lstStyle/>
+          <a:p>
+            <a:pPr algn="ctr"/>
+            <a:endParaRPr lang="en-US">
+              <a:solidFill>
+                <a:schemeClr val="bg1"/>
+              </a:solidFill>
+            </a:endParaRPr>
+          </a:p>
+        </p:txBody>
+      </p:sp>
+      <p:grpSp>
+        <p:nvGrpSpPr>
+          <p:cNvPr id="47" name="Group 10">
+            <a:extLst>
+              <a:ext uri="{FF2B5EF4-FFF2-40B4-BE49-F238E27FC236}">
+                <a16:creationId xmlns:a16="http://schemas.microsoft.com/office/drawing/2014/main" id="{4D431671-5191-4947-8899-E90505A70426}"/>
+              </a:ext>
+              <a:ext uri="{C183D7F6-B498-43B3-948B-1728B52AA6E4}">
+                <adec:decorative xmlns:adec="http://schemas.microsoft.com/office/drawing/2017/decorative" val="1"/>
+              </a:ext>
+            </a:extLst>
+          </p:cNvPr>
+          <p:cNvGrpSpPr>
+            <a:grpSpLocks noGrp="1" noUngrp="1" noRot="1" noChangeAspect="1" noMove="1" noResize="1"/>
+          </p:cNvGrpSpPr>
+          <p:nvPr>
+            <p:extLst>
+              <p:ext uri="{386F3935-93C4-4BCD-93E2-E3B085C9AB24}">
+                <p16:designElem xmlns:p16="http://schemas.microsoft.com/office/powerpoint/2015/main" val="1"/>
+              </p:ext>
+            </p:extLst>
+          </p:nvPr>
+        </p:nvGrpSpPr>
+        <p:grpSpPr>
+          <a:xfrm>
+            <a:off x="-6214" y="-1"/>
+            <a:ext cx="12214827" cy="6858000"/>
+            <a:chOff x="-6214" y="-1"/>
+            <a:chExt cx="12214827" cy="6858000"/>
+          </a:xfrm>
+        </p:grpSpPr>
+        <p:cxnSp>
+          <p:nvCxnSpPr>
+            <p:cNvPr id="12" name="Straight Connector 11">
+              <a:extLst>
+                <a:ext uri="{FF2B5EF4-FFF2-40B4-BE49-F238E27FC236}">
+                  <a16:creationId xmlns:a16="http://schemas.microsoft.com/office/drawing/2014/main" id="{877D2E98-ED65-4121-9DA5-6DBB831D0FB2}"/>
+                </a:ext>
+                <a:ext uri="{C183D7F6-B498-43B3-948B-1728B52AA6E4}">
+                  <adec:decorative xmlns:adec="http://schemas.microsoft.com/office/drawing/2017/decorative" val="1"/>
+                </a:ext>
+              </a:extLst>
+            </p:cNvPr>
+            <p:cNvCxnSpPr>
+              <a:cxnSpLocks/>
+            </p:cNvCxnSpPr>
+            <p:nvPr>
+              <p:extLst>
+                <p:ext uri="{386F3935-93C4-4BCD-93E2-E3B085C9AB24}">
+                  <p16:designElem xmlns:p16="http://schemas.microsoft.com/office/powerpoint/2015/main" val="1"/>
+                </p:ext>
+              </p:extLst>
+            </p:nvPr>
+          </p:nvCxnSpPr>
+          <p:spPr>
+            <a:xfrm>
+              <a:off x="-6214" y="6686283"/>
+              <a:ext cx="12192000" cy="0"/>
+            </a:xfrm>
+            <a:prstGeom prst="line">
+              <a:avLst/>
+            </a:prstGeom>
+            <a:ln w="12700">
+              <a:solidFill>
+                <a:srgbClr val="BCBCBC">
+                  <a:alpha val="29804"/>
+                </a:srgbClr>
+              </a:solidFill>
+              <a:prstDash val="sysDot"/>
+            </a:ln>
+          </p:spPr>
+          <p:style>
+            <a:lnRef idx="1">
+              <a:schemeClr val="accent1"/>
+            </a:lnRef>
+            <a:fillRef idx="0">
+              <a:schemeClr val="accent1"/>
+            </a:fillRef>
+            <a:effectRef idx="0">
+              <a:schemeClr val="accent1"/>
+            </a:effectRef>
+            <a:fontRef idx="minor">
+              <a:schemeClr val="tx1"/>
+            </a:fontRef>
+          </p:style>
+        </p:cxnSp>
+        <p:cxnSp>
+          <p:nvCxnSpPr>
+            <p:cNvPr id="13" name="Straight Connector 12">
+              <a:extLst>
+                <a:ext uri="{FF2B5EF4-FFF2-40B4-BE49-F238E27FC236}">
+                  <a16:creationId xmlns:a16="http://schemas.microsoft.com/office/drawing/2014/main" id="{DA94A307-5B5D-4E42-95B3-064D5093ADE5}"/>
+                </a:ext>
+                <a:ext uri="{C183D7F6-B498-43B3-948B-1728B52AA6E4}">
+                  <adec:decorative xmlns:adec="http://schemas.microsoft.com/office/drawing/2017/decorative" val="1"/>
+                </a:ext>
+              </a:extLst>
+            </p:cNvPr>
+            <p:cNvCxnSpPr>
+              <a:cxnSpLocks/>
+            </p:cNvCxnSpPr>
+            <p:nvPr>
+              <p:extLst>
+                <p:ext uri="{386F3935-93C4-4BCD-93E2-E3B085C9AB24}">
+                  <p16:designElem xmlns:p16="http://schemas.microsoft.com/office/powerpoint/2015/main" val="1"/>
+                </p:ext>
+              </p:extLst>
+            </p:nvPr>
+          </p:nvCxnSpPr>
+          <p:spPr>
+            <a:xfrm>
+              <a:off x="0" y="-1"/>
+              <a:ext cx="0" cy="6858000"/>
+            </a:xfrm>
+            <a:prstGeom prst="line">
+              <a:avLst/>
+            </a:prstGeom>
+            <a:ln w="12700">
+              <a:solidFill>
+                <a:srgbClr val="BCBCBC">
+                  <a:alpha val="29804"/>
+                </a:srgbClr>
+              </a:solidFill>
+              <a:prstDash val="sysDot"/>
+            </a:ln>
+          </p:spPr>
+          <p:style>
+            <a:lnRef idx="1">
+              <a:schemeClr val="accent1"/>
+            </a:lnRef>
+            <a:fillRef idx="0">
+              <a:schemeClr val="accent1"/>
+            </a:fillRef>
+            <a:effectRef idx="0">
+              <a:schemeClr val="accent1"/>
+            </a:effectRef>
+            <a:fontRef idx="minor">
+              <a:schemeClr val="tx1"/>
+            </a:fontRef>
+          </p:style>
+        </p:cxnSp>
+        <p:cxnSp>
+          <p:nvCxnSpPr>
+            <p:cNvPr id="14" name="Straight Connector 13">
+              <a:extLst>
+                <a:ext uri="{FF2B5EF4-FFF2-40B4-BE49-F238E27FC236}">
+                  <a16:creationId xmlns:a16="http://schemas.microsoft.com/office/drawing/2014/main" id="{8CB3B32C-3BDA-4D41-9802-681B0599FD3C}"/>
+                </a:ext>
+                <a:ext uri="{C183D7F6-B498-43B3-948B-1728B52AA6E4}">
+                  <adec:decorative xmlns:adec="http://schemas.microsoft.com/office/drawing/2017/decorative" val="1"/>
+                </a:ext>
+              </a:extLst>
+            </p:cNvPr>
+            <p:cNvCxnSpPr>
+              <a:cxnSpLocks/>
+            </p:cNvCxnSpPr>
+            <p:nvPr>
+              <p:extLst>
+                <p:ext uri="{386F3935-93C4-4BCD-93E2-E3B085C9AB24}">
+                  <p16:designElem xmlns:p16="http://schemas.microsoft.com/office/powerpoint/2015/main" val="1"/>
+                </p:ext>
+              </p:extLst>
+            </p:nvPr>
+          </p:nvCxnSpPr>
+          <p:spPr>
+            <a:xfrm>
+              <a:off x="11993258" y="-1"/>
+              <a:ext cx="0" cy="6858000"/>
+            </a:xfrm>
+            <a:prstGeom prst="line">
+              <a:avLst/>
+            </a:prstGeom>
+            <a:ln w="12700">
+              <a:solidFill>
+                <a:srgbClr val="BCBCBC">
+                  <a:alpha val="29804"/>
+                </a:srgbClr>
+              </a:solidFill>
+              <a:prstDash val="sysDot"/>
+            </a:ln>
+          </p:spPr>
+          <p:style>
+            <a:lnRef idx="1">
+              <a:schemeClr val="accent1"/>
+            </a:lnRef>
+            <a:fillRef idx="0">
+              <a:schemeClr val="accent1"/>
+            </a:fillRef>
+            <a:effectRef idx="0">
+              <a:schemeClr val="accent1"/>
+            </a:effectRef>
+            <a:fontRef idx="minor">
+              <a:schemeClr val="tx1"/>
+            </a:fontRef>
+          </p:style>
+        </p:cxnSp>
+        <p:cxnSp>
+          <p:nvCxnSpPr>
+            <p:cNvPr id="15" name="Straight Connector 14">
+              <a:extLst>
+                <a:ext uri="{FF2B5EF4-FFF2-40B4-BE49-F238E27FC236}">
+                  <a16:creationId xmlns:a16="http://schemas.microsoft.com/office/drawing/2014/main" id="{35BDBFD6-7C61-4520-8203-BAB1986C158C}"/>
+                </a:ext>
+                <a:ext uri="{C183D7F6-B498-43B3-948B-1728B52AA6E4}">
+                  <adec:decorative xmlns:adec="http://schemas.microsoft.com/office/drawing/2017/decorative" val="1"/>
+                </a:ext>
+              </a:extLst>
+            </p:cNvPr>
+            <p:cNvCxnSpPr>
+              <a:cxnSpLocks/>
+            </p:cNvCxnSpPr>
+            <p:nvPr>
+              <p:extLst>
+                <p:ext uri="{386F3935-93C4-4BCD-93E2-E3B085C9AB24}">
+                  <p16:designElem xmlns:p16="http://schemas.microsoft.com/office/powerpoint/2015/main" val="1"/>
+                </p:ext>
+              </p:extLst>
+            </p:nvPr>
+          </p:nvCxnSpPr>
+          <p:spPr>
+            <a:xfrm>
+              <a:off x="192528" y="-1"/>
+              <a:ext cx="0" cy="6858000"/>
+            </a:xfrm>
+            <a:prstGeom prst="line">
+              <a:avLst/>
+            </a:prstGeom>
+            <a:ln w="12700">
+              <a:solidFill>
+                <a:srgbClr val="BCBCBC">
+                  <a:alpha val="29804"/>
+                </a:srgbClr>
+              </a:solidFill>
+              <a:prstDash val="sysDot"/>
+            </a:ln>
+          </p:spPr>
+          <p:style>
+            <a:lnRef idx="1">
+              <a:schemeClr val="accent1"/>
+            </a:lnRef>
+            <a:fillRef idx="0">
+              <a:schemeClr val="accent1"/>
+            </a:fillRef>
+            <a:effectRef idx="0">
+              <a:schemeClr val="accent1"/>
+            </a:effectRef>
+            <a:fontRef idx="minor">
+              <a:schemeClr val="tx1"/>
+            </a:fontRef>
+          </p:style>
+        </p:cxnSp>
+        <p:cxnSp>
+          <p:nvCxnSpPr>
+            <p:cNvPr id="16" name="Straight Connector 15">
+              <a:extLst>
+                <a:ext uri="{FF2B5EF4-FFF2-40B4-BE49-F238E27FC236}">
+                  <a16:creationId xmlns:a16="http://schemas.microsoft.com/office/drawing/2014/main" id="{D4ABA4D7-9904-42C4-B0CD-B1CE2E0D3734}"/>
+                </a:ext>
+                <a:ext uri="{C183D7F6-B498-43B3-948B-1728B52AA6E4}">
+                  <adec:decorative xmlns:adec="http://schemas.microsoft.com/office/drawing/2017/decorative" val="1"/>
+                </a:ext>
+              </a:extLst>
+            </p:cNvPr>
+            <p:cNvCxnSpPr>
+              <a:cxnSpLocks/>
+            </p:cNvCxnSpPr>
+            <p:nvPr>
+              <p:extLst>
+                <p:ext uri="{386F3935-93C4-4BCD-93E2-E3B085C9AB24}">
+                  <p16:designElem xmlns:p16="http://schemas.microsoft.com/office/powerpoint/2015/main" val="1"/>
+                </p:ext>
+              </p:extLst>
+            </p:nvPr>
+          </p:nvCxnSpPr>
+          <p:spPr>
+            <a:xfrm>
+              <a:off x="1175922" y="-1"/>
+              <a:ext cx="0" cy="6858000"/>
+            </a:xfrm>
+            <a:prstGeom prst="line">
+              <a:avLst/>
+            </a:prstGeom>
+            <a:ln w="12700">
+              <a:solidFill>
+                <a:srgbClr val="BCBCBC">
+                  <a:alpha val="29804"/>
+                </a:srgbClr>
+              </a:solidFill>
+              <a:prstDash val="sysDot"/>
+            </a:ln>
+          </p:spPr>
+          <p:style>
+            <a:lnRef idx="1">
+              <a:schemeClr val="accent1"/>
+            </a:lnRef>
+            <a:fillRef idx="0">
+              <a:schemeClr val="accent1"/>
+            </a:fillRef>
+            <a:effectRef idx="0">
+              <a:schemeClr val="accent1"/>
+            </a:effectRef>
+            <a:fontRef idx="minor">
+              <a:schemeClr val="tx1"/>
+            </a:fontRef>
+          </p:style>
+        </p:cxnSp>
+        <p:cxnSp>
+          <p:nvCxnSpPr>
+            <p:cNvPr id="17" name="Straight Connector 16">
+              <a:extLst>
+                <a:ext uri="{FF2B5EF4-FFF2-40B4-BE49-F238E27FC236}">
+                  <a16:creationId xmlns:a16="http://schemas.microsoft.com/office/drawing/2014/main" id="{BB63F0D6-8747-4126-9359-B730EB21B79A}"/>
+                </a:ext>
+                <a:ext uri="{C183D7F6-B498-43B3-948B-1728B52AA6E4}">
+                  <adec:decorative xmlns:adec="http://schemas.microsoft.com/office/drawing/2017/decorative" val="1"/>
+                </a:ext>
+              </a:extLst>
+            </p:cNvPr>
+            <p:cNvCxnSpPr>
+              <a:cxnSpLocks/>
+            </p:cNvCxnSpPr>
+            <p:nvPr>
+              <p:extLst>
+                <p:ext uri="{386F3935-93C4-4BCD-93E2-E3B085C9AB24}">
+                  <p16:designElem xmlns:p16="http://schemas.microsoft.com/office/powerpoint/2015/main" val="1"/>
+                </p:ext>
+              </p:extLst>
+            </p:nvPr>
+          </p:nvCxnSpPr>
+          <p:spPr>
+            <a:xfrm>
+              <a:off x="2159316" y="-1"/>
+              <a:ext cx="0" cy="6858000"/>
+            </a:xfrm>
+            <a:prstGeom prst="line">
+              <a:avLst/>
+            </a:prstGeom>
+            <a:ln w="12700">
+              <a:solidFill>
+                <a:srgbClr val="BCBCBC">
+                  <a:alpha val="29804"/>
+                </a:srgbClr>
+              </a:solidFill>
+              <a:prstDash val="sysDot"/>
+            </a:ln>
+          </p:spPr>
+          <p:style>
+            <a:lnRef idx="1">
+              <a:schemeClr val="accent1"/>
+            </a:lnRef>
+            <a:fillRef idx="0">
+              <a:schemeClr val="accent1"/>
+            </a:fillRef>
+            <a:effectRef idx="0">
+              <a:schemeClr val="accent1"/>
+            </a:effectRef>
+            <a:fontRef idx="minor">
+              <a:schemeClr val="tx1"/>
+            </a:fontRef>
+          </p:style>
+        </p:cxnSp>
+        <p:cxnSp>
+          <p:nvCxnSpPr>
+            <p:cNvPr id="18" name="Straight Connector 17">
+              <a:extLst>
+                <a:ext uri="{FF2B5EF4-FFF2-40B4-BE49-F238E27FC236}">
+                  <a16:creationId xmlns:a16="http://schemas.microsoft.com/office/drawing/2014/main" id="{D91CD660-F5B2-49AC-9EFC-CE94B843B4DA}"/>
+                </a:ext>
+                <a:ext uri="{C183D7F6-B498-43B3-948B-1728B52AA6E4}">
+                  <adec:decorative xmlns:adec="http://schemas.microsoft.com/office/drawing/2017/decorative" val="1"/>
+                </a:ext>
+              </a:extLst>
+            </p:cNvPr>
+            <p:cNvCxnSpPr>
+              <a:cxnSpLocks/>
+            </p:cNvCxnSpPr>
+            <p:nvPr>
+              <p:extLst>
+                <p:ext uri="{386F3935-93C4-4BCD-93E2-E3B085C9AB24}">
+                  <p16:designElem xmlns:p16="http://schemas.microsoft.com/office/powerpoint/2015/main" val="1"/>
+                </p:ext>
+              </p:extLst>
+            </p:nvPr>
+          </p:nvCxnSpPr>
+          <p:spPr>
+            <a:xfrm>
+              <a:off x="3142710" y="-1"/>
+              <a:ext cx="0" cy="6858000"/>
+            </a:xfrm>
+            <a:prstGeom prst="line">
+              <a:avLst/>
+            </a:prstGeom>
+            <a:ln w="12700">
+              <a:solidFill>
+                <a:srgbClr val="BCBCBC">
+                  <a:alpha val="29804"/>
+                </a:srgbClr>
+              </a:solidFill>
+              <a:prstDash val="sysDot"/>
+            </a:ln>
+          </p:spPr>
+          <p:style>
+            <a:lnRef idx="1">
+              <a:schemeClr val="accent1"/>
+            </a:lnRef>
+            <a:fillRef idx="0">
+              <a:schemeClr val="accent1"/>
+            </a:fillRef>
+            <a:effectRef idx="0">
+              <a:schemeClr val="accent1"/>
+            </a:effectRef>
+            <a:fontRef idx="minor">
+              <a:schemeClr val="tx1"/>
+            </a:fontRef>
+          </p:style>
+        </p:cxnSp>
+        <p:cxnSp>
+          <p:nvCxnSpPr>
+            <p:cNvPr id="19" name="Straight Connector 18">
+              <a:extLst>
+                <a:ext uri="{FF2B5EF4-FFF2-40B4-BE49-F238E27FC236}">
+                  <a16:creationId xmlns:a16="http://schemas.microsoft.com/office/drawing/2014/main" id="{A4BEB7EB-8E7F-4A4B-8581-73CE2003F2F7}"/>
+                </a:ext>
+                <a:ext uri="{C183D7F6-B498-43B3-948B-1728B52AA6E4}">
+                  <adec:decorative xmlns:adec="http://schemas.microsoft.com/office/drawing/2017/decorative" val="1"/>
+                </a:ext>
+              </a:extLst>
+            </p:cNvPr>
+            <p:cNvCxnSpPr>
+              <a:cxnSpLocks/>
+            </p:cNvCxnSpPr>
+            <p:nvPr>
+              <p:extLst>
+                <p:ext uri="{386F3935-93C4-4BCD-93E2-E3B085C9AB24}">
+                  <p16:designElem xmlns:p16="http://schemas.microsoft.com/office/powerpoint/2015/main" val="1"/>
+                </p:ext>
+              </p:extLst>
+            </p:nvPr>
+          </p:nvCxnSpPr>
+          <p:spPr>
+            <a:xfrm>
+              <a:off x="4126104" y="-1"/>
+              <a:ext cx="0" cy="6858000"/>
+            </a:xfrm>
+            <a:prstGeom prst="line">
+              <a:avLst/>
+            </a:prstGeom>
+            <a:ln w="12700">
+              <a:solidFill>
+                <a:srgbClr val="BCBCBC">
+                  <a:alpha val="29804"/>
+                </a:srgbClr>
+              </a:solidFill>
+              <a:prstDash val="sysDot"/>
+            </a:ln>
+          </p:spPr>
+          <p:style>
+            <a:lnRef idx="1">
+              <a:schemeClr val="accent1"/>
+            </a:lnRef>
+            <a:fillRef idx="0">
+              <a:schemeClr val="accent1"/>
+            </a:fillRef>
+            <a:effectRef idx="0">
+              <a:schemeClr val="accent1"/>
+            </a:effectRef>
+            <a:fontRef idx="minor">
+              <a:schemeClr val="tx1"/>
+            </a:fontRef>
+          </p:style>
+        </p:cxnSp>
+        <p:cxnSp>
+          <p:nvCxnSpPr>
+            <p:cNvPr id="20" name="Straight Connector 19">
+              <a:extLst>
+                <a:ext uri="{FF2B5EF4-FFF2-40B4-BE49-F238E27FC236}">
+                  <a16:creationId xmlns:a16="http://schemas.microsoft.com/office/drawing/2014/main" id="{B04FB70E-6820-4456-872A-937F520606C5}"/>
+                </a:ext>
+                <a:ext uri="{C183D7F6-B498-43B3-948B-1728B52AA6E4}">
+                  <adec:decorative xmlns:adec="http://schemas.microsoft.com/office/drawing/2017/decorative" val="1"/>
+                </a:ext>
+              </a:extLst>
+            </p:cNvPr>
+            <p:cNvCxnSpPr>
+              <a:cxnSpLocks/>
+            </p:cNvCxnSpPr>
+            <p:nvPr>
+              <p:extLst>
+                <p:ext uri="{386F3935-93C4-4BCD-93E2-E3B085C9AB24}">
+                  <p16:designElem xmlns:p16="http://schemas.microsoft.com/office/powerpoint/2015/main" val="1"/>
+                </p:ext>
+              </p:extLst>
+            </p:nvPr>
+          </p:nvCxnSpPr>
+          <p:spPr>
+            <a:xfrm>
+              <a:off x="5109498" y="-1"/>
+              <a:ext cx="0" cy="6858000"/>
+            </a:xfrm>
+            <a:prstGeom prst="line">
+              <a:avLst/>
+            </a:prstGeom>
+            <a:ln w="12700">
+              <a:solidFill>
+                <a:srgbClr val="BCBCBC">
+                  <a:alpha val="29804"/>
+                </a:srgbClr>
+              </a:solidFill>
+              <a:prstDash val="sysDot"/>
+            </a:ln>
+          </p:spPr>
+          <p:style>
+            <a:lnRef idx="1">
+              <a:schemeClr val="accent1"/>
+            </a:lnRef>
+            <a:fillRef idx="0">
+              <a:schemeClr val="accent1"/>
+            </a:fillRef>
+            <a:effectRef idx="0">
+              <a:schemeClr val="accent1"/>
+            </a:effectRef>
+            <a:fontRef idx="minor">
+              <a:schemeClr val="tx1"/>
+            </a:fontRef>
+          </p:style>
+        </p:cxnSp>
+        <p:cxnSp>
+          <p:nvCxnSpPr>
+            <p:cNvPr id="21" name="Straight Connector 20">
+              <a:extLst>
+                <a:ext uri="{FF2B5EF4-FFF2-40B4-BE49-F238E27FC236}">
+                  <a16:creationId xmlns:a16="http://schemas.microsoft.com/office/drawing/2014/main" id="{E3598DD6-9887-4CF7-BAFE-F96E0324EB9E}"/>
+                </a:ext>
+                <a:ext uri="{C183D7F6-B498-43B3-948B-1728B52AA6E4}">
+                  <adec:decorative xmlns:adec="http://schemas.microsoft.com/office/drawing/2017/decorative" val="1"/>
+                </a:ext>
+              </a:extLst>
+            </p:cNvPr>
+            <p:cNvCxnSpPr>
+              <a:cxnSpLocks/>
+            </p:cNvCxnSpPr>
+            <p:nvPr>
+              <p:extLst>
+                <p:ext uri="{386F3935-93C4-4BCD-93E2-E3B085C9AB24}">
+                  <p16:designElem xmlns:p16="http://schemas.microsoft.com/office/powerpoint/2015/main" val="1"/>
+                </p:ext>
+              </p:extLst>
+            </p:nvPr>
+          </p:nvCxnSpPr>
+          <p:spPr>
+            <a:xfrm>
+              <a:off x="6092892" y="-1"/>
+              <a:ext cx="0" cy="6858000"/>
+            </a:xfrm>
+            <a:prstGeom prst="line">
+              <a:avLst/>
+            </a:prstGeom>
+            <a:ln w="12700">
+              <a:solidFill>
+                <a:srgbClr val="BCBCBC">
+                  <a:alpha val="29804"/>
+                </a:srgbClr>
+              </a:solidFill>
+              <a:prstDash val="sysDot"/>
+            </a:ln>
+          </p:spPr>
+          <p:style>
+            <a:lnRef idx="1">
+              <a:schemeClr val="accent1"/>
+            </a:lnRef>
+            <a:fillRef idx="0">
+              <a:schemeClr val="accent1"/>
+            </a:fillRef>
+            <a:effectRef idx="0">
+              <a:schemeClr val="accent1"/>
+            </a:effectRef>
+            <a:fontRef idx="minor">
+              <a:schemeClr val="tx1"/>
+            </a:fontRef>
+          </p:style>
+        </p:cxnSp>
+        <p:cxnSp>
+          <p:nvCxnSpPr>
+            <p:cNvPr id="22" name="Straight Connector 21">
+              <a:extLst>
+                <a:ext uri="{FF2B5EF4-FFF2-40B4-BE49-F238E27FC236}">
+                  <a16:creationId xmlns:a16="http://schemas.microsoft.com/office/drawing/2014/main" id="{AA503E64-565F-465B-A25C-042C5706C568}"/>
+                </a:ext>
+                <a:ext uri="{C183D7F6-B498-43B3-948B-1728B52AA6E4}">
+                  <adec:decorative xmlns:adec="http://schemas.microsoft.com/office/drawing/2017/decorative" val="1"/>
+                </a:ext>
+              </a:extLst>
+            </p:cNvPr>
+            <p:cNvCxnSpPr>
+              <a:cxnSpLocks/>
+            </p:cNvCxnSpPr>
+            <p:nvPr>
+              <p:extLst>
+                <p:ext uri="{386F3935-93C4-4BCD-93E2-E3B085C9AB24}">
+                  <p16:designElem xmlns:p16="http://schemas.microsoft.com/office/powerpoint/2015/main" val="1"/>
+                </p:ext>
+              </p:extLst>
+            </p:nvPr>
+          </p:nvCxnSpPr>
+          <p:spPr>
+            <a:xfrm>
+              <a:off x="7076286" y="-1"/>
+              <a:ext cx="0" cy="6858000"/>
+            </a:xfrm>
+            <a:prstGeom prst="line">
+              <a:avLst/>
+            </a:prstGeom>
+            <a:ln w="12700">
+              <a:solidFill>
+                <a:srgbClr val="BCBCBC">
+                  <a:alpha val="29804"/>
+                </a:srgbClr>
+              </a:solidFill>
+              <a:prstDash val="sysDot"/>
+            </a:ln>
+          </p:spPr>
+          <p:style>
+            <a:lnRef idx="1">
+              <a:schemeClr val="accent1"/>
+            </a:lnRef>
+            <a:fillRef idx="0">
+              <a:schemeClr val="accent1"/>
+            </a:fillRef>
+            <a:effectRef idx="0">
+              <a:schemeClr val="accent1"/>
+            </a:effectRef>
+            <a:fontRef idx="minor">
+              <a:schemeClr val="tx1"/>
+            </a:fontRef>
+          </p:style>
+        </p:cxnSp>
+        <p:cxnSp>
+          <p:nvCxnSpPr>
+            <p:cNvPr id="23" name="Straight Connector 22">
+              <a:extLst>
+                <a:ext uri="{FF2B5EF4-FFF2-40B4-BE49-F238E27FC236}">
+                  <a16:creationId xmlns:a16="http://schemas.microsoft.com/office/drawing/2014/main" id="{A140EE7B-5CA1-4DCB-8652-6E4D2147B0E7}"/>
+                </a:ext>
+                <a:ext uri="{C183D7F6-B498-43B3-948B-1728B52AA6E4}">
+                  <adec:decorative xmlns:adec="http://schemas.microsoft.com/office/drawing/2017/decorative" val="1"/>
+                </a:ext>
+              </a:extLst>
+            </p:cNvPr>
+            <p:cNvCxnSpPr>
+              <a:cxnSpLocks/>
+            </p:cNvCxnSpPr>
+            <p:nvPr>
+              <p:extLst>
+                <p:ext uri="{386F3935-93C4-4BCD-93E2-E3B085C9AB24}">
+                  <p16:designElem xmlns:p16="http://schemas.microsoft.com/office/powerpoint/2015/main" val="1"/>
+                </p:ext>
+              </p:extLst>
+            </p:nvPr>
+          </p:nvCxnSpPr>
+          <p:spPr>
+            <a:xfrm>
+              <a:off x="8059680" y="-1"/>
+              <a:ext cx="0" cy="6858000"/>
+            </a:xfrm>
+            <a:prstGeom prst="line">
+              <a:avLst/>
+            </a:prstGeom>
+            <a:ln w="12700">
+              <a:solidFill>
+                <a:srgbClr val="BCBCBC">
+                  <a:alpha val="29804"/>
+                </a:srgbClr>
+              </a:solidFill>
+              <a:prstDash val="sysDot"/>
+            </a:ln>
+          </p:spPr>
+          <p:style>
+            <a:lnRef idx="1">
+              <a:schemeClr val="accent1"/>
+            </a:lnRef>
+            <a:fillRef idx="0">
+              <a:schemeClr val="accent1"/>
+            </a:fillRef>
+            <a:effectRef idx="0">
+              <a:schemeClr val="accent1"/>
+            </a:effectRef>
+            <a:fontRef idx="minor">
+              <a:schemeClr val="tx1"/>
+            </a:fontRef>
+          </p:style>
+        </p:cxnSp>
+        <p:cxnSp>
+          <p:nvCxnSpPr>
+            <p:cNvPr id="24" name="Straight Connector 23">
+              <a:extLst>
+                <a:ext uri="{FF2B5EF4-FFF2-40B4-BE49-F238E27FC236}">
+                  <a16:creationId xmlns:a16="http://schemas.microsoft.com/office/drawing/2014/main" id="{F85077BE-700D-4C44-AA4D-7CF4E8FD71A9}"/>
+                </a:ext>
+                <a:ext uri="{C183D7F6-B498-43B3-948B-1728B52AA6E4}">
+                  <adec:decorative xmlns:adec="http://schemas.microsoft.com/office/drawing/2017/decorative" val="1"/>
+                </a:ext>
+              </a:extLst>
+            </p:cNvPr>
+            <p:cNvCxnSpPr>
+              <a:cxnSpLocks/>
+            </p:cNvCxnSpPr>
+            <p:nvPr>
+              <p:extLst>
+                <p:ext uri="{386F3935-93C4-4BCD-93E2-E3B085C9AB24}">
+                  <p16:designElem xmlns:p16="http://schemas.microsoft.com/office/powerpoint/2015/main" val="1"/>
+                </p:ext>
+              </p:extLst>
+            </p:nvPr>
+          </p:nvCxnSpPr>
+          <p:spPr>
+            <a:xfrm>
+              <a:off x="9043074" y="-1"/>
+              <a:ext cx="0" cy="6858000"/>
+            </a:xfrm>
+            <a:prstGeom prst="line">
+              <a:avLst/>
+            </a:prstGeom>
+            <a:ln w="12700">
+              <a:solidFill>
+                <a:srgbClr val="BCBCBC">
+                  <a:alpha val="29804"/>
+                </a:srgbClr>
+              </a:solidFill>
+              <a:prstDash val="sysDot"/>
+            </a:ln>
+          </p:spPr>
+          <p:style>
+            <a:lnRef idx="1">
+              <a:schemeClr val="accent1"/>
+            </a:lnRef>
+            <a:fillRef idx="0">
+              <a:schemeClr val="accent1"/>
+            </a:fillRef>
+            <a:effectRef idx="0">
+              <a:schemeClr val="accent1"/>
+            </a:effectRef>
+            <a:fontRef idx="minor">
+              <a:schemeClr val="tx1"/>
+            </a:fontRef>
+          </p:style>
+        </p:cxnSp>
+        <p:cxnSp>
+          <p:nvCxnSpPr>
+            <p:cNvPr id="25" name="Straight Connector 24">
+              <a:extLst>
+                <a:ext uri="{FF2B5EF4-FFF2-40B4-BE49-F238E27FC236}">
+                  <a16:creationId xmlns:a16="http://schemas.microsoft.com/office/drawing/2014/main" id="{FB8B3FEB-D353-443D-A148-3915606516D5}"/>
+                </a:ext>
+                <a:ext uri="{C183D7F6-B498-43B3-948B-1728B52AA6E4}">
+                  <adec:decorative xmlns:adec="http://schemas.microsoft.com/office/drawing/2017/decorative" val="1"/>
+                </a:ext>
+              </a:extLst>
+            </p:cNvPr>
+            <p:cNvCxnSpPr>
+              <a:cxnSpLocks/>
+            </p:cNvCxnSpPr>
+            <p:nvPr>
+              <p:extLst>
+                <p:ext uri="{386F3935-93C4-4BCD-93E2-E3B085C9AB24}">
+                  <p16:designElem xmlns:p16="http://schemas.microsoft.com/office/powerpoint/2015/main" val="1"/>
+                </p:ext>
+              </p:extLst>
+            </p:nvPr>
+          </p:nvCxnSpPr>
+          <p:spPr>
+            <a:xfrm>
+              <a:off x="10026468" y="-1"/>
+              <a:ext cx="0" cy="6858000"/>
+            </a:xfrm>
+            <a:prstGeom prst="line">
+              <a:avLst/>
+            </a:prstGeom>
+            <a:ln w="12700">
+              <a:solidFill>
+                <a:srgbClr val="BCBCBC">
+                  <a:alpha val="29804"/>
+                </a:srgbClr>
+              </a:solidFill>
+              <a:prstDash val="sysDot"/>
+            </a:ln>
+          </p:spPr>
+          <p:style>
+            <a:lnRef idx="1">
+              <a:schemeClr val="accent1"/>
+            </a:lnRef>
+            <a:fillRef idx="0">
+              <a:schemeClr val="accent1"/>
+            </a:fillRef>
+            <a:effectRef idx="0">
+              <a:schemeClr val="accent1"/>
+            </a:effectRef>
+            <a:fontRef idx="minor">
+              <a:schemeClr val="tx1"/>
+            </a:fontRef>
+          </p:style>
+        </p:cxnSp>
+        <p:cxnSp>
+          <p:nvCxnSpPr>
+            <p:cNvPr id="26" name="Straight Connector 25">
+              <a:extLst>
+                <a:ext uri="{FF2B5EF4-FFF2-40B4-BE49-F238E27FC236}">
+                  <a16:creationId xmlns:a16="http://schemas.microsoft.com/office/drawing/2014/main" id="{91FF5FBB-3BD8-46EB-BDF9-081B29A444BD}"/>
+                </a:ext>
+                <a:ext uri="{C183D7F6-B498-43B3-948B-1728B52AA6E4}">
+                  <adec:decorative xmlns:adec="http://schemas.microsoft.com/office/drawing/2017/decorative" val="1"/>
+                </a:ext>
+              </a:extLst>
+            </p:cNvPr>
+            <p:cNvCxnSpPr>
+              <a:cxnSpLocks/>
+            </p:cNvCxnSpPr>
+            <p:nvPr>
+              <p:extLst>
+                <p:ext uri="{386F3935-93C4-4BCD-93E2-E3B085C9AB24}">
+                  <p16:designElem xmlns:p16="http://schemas.microsoft.com/office/powerpoint/2015/main" val="1"/>
+                </p:ext>
+              </p:extLst>
+            </p:nvPr>
+          </p:nvCxnSpPr>
+          <p:spPr>
+            <a:xfrm>
+              <a:off x="11009862" y="-1"/>
+              <a:ext cx="0" cy="6858000"/>
+            </a:xfrm>
+            <a:prstGeom prst="line">
+              <a:avLst/>
+            </a:prstGeom>
+            <a:ln w="12700">
+              <a:solidFill>
+                <a:srgbClr val="BCBCBC">
+                  <a:alpha val="29804"/>
+                </a:srgbClr>
+              </a:solidFill>
+              <a:prstDash val="sysDot"/>
+            </a:ln>
+          </p:spPr>
+          <p:style>
+            <a:lnRef idx="1">
+              <a:schemeClr val="accent1"/>
+            </a:lnRef>
+            <a:fillRef idx="0">
+              <a:schemeClr val="accent1"/>
+            </a:fillRef>
+            <a:effectRef idx="0">
+              <a:schemeClr val="accent1"/>
+            </a:effectRef>
+            <a:fontRef idx="minor">
+              <a:schemeClr val="tx1"/>
+            </a:fontRef>
+          </p:style>
+        </p:cxnSp>
+        <p:cxnSp>
+          <p:nvCxnSpPr>
+            <p:cNvPr id="27" name="Straight Connector 26">
+              <a:extLst>
+                <a:ext uri="{FF2B5EF4-FFF2-40B4-BE49-F238E27FC236}">
+                  <a16:creationId xmlns:a16="http://schemas.microsoft.com/office/drawing/2014/main" id="{DC2E11FD-78A4-4F5C-A419-F0237DCAD274}"/>
+                </a:ext>
+                <a:ext uri="{C183D7F6-B498-43B3-948B-1728B52AA6E4}">
+                  <adec:decorative xmlns:adec="http://schemas.microsoft.com/office/drawing/2017/decorative" val="1"/>
+                </a:ext>
+              </a:extLst>
+            </p:cNvPr>
+            <p:cNvCxnSpPr>
+              <a:cxnSpLocks/>
+            </p:cNvCxnSpPr>
+            <p:nvPr>
+              <p:extLst>
+                <p:ext uri="{386F3935-93C4-4BCD-93E2-E3B085C9AB24}">
+                  <p16:designElem xmlns:p16="http://schemas.microsoft.com/office/powerpoint/2015/main" val="1"/>
+                </p:ext>
+              </p:extLst>
+            </p:nvPr>
+          </p:nvCxnSpPr>
+          <p:spPr>
+            <a:xfrm>
+              <a:off x="12185786" y="-1"/>
+              <a:ext cx="0" cy="6858000"/>
+            </a:xfrm>
+            <a:prstGeom prst="line">
+              <a:avLst/>
+            </a:prstGeom>
+            <a:ln w="12700">
+              <a:solidFill>
+                <a:srgbClr val="BCBCBC">
+                  <a:alpha val="29804"/>
+                </a:srgbClr>
+              </a:solidFill>
+              <a:prstDash val="sysDot"/>
+            </a:ln>
+          </p:spPr>
+          <p:style>
+            <a:lnRef idx="1">
+              <a:schemeClr val="accent1"/>
+            </a:lnRef>
+            <a:fillRef idx="0">
+              <a:schemeClr val="accent1"/>
+            </a:fillRef>
+            <a:effectRef idx="0">
+              <a:schemeClr val="accent1"/>
+            </a:effectRef>
+            <a:fontRef idx="minor">
+              <a:schemeClr val="tx1"/>
+            </a:fontRef>
+          </p:style>
+        </p:cxnSp>
+        <p:cxnSp>
+          <p:nvCxnSpPr>
+            <p:cNvPr id="28" name="Straight Connector 27">
+              <a:extLst>
+                <a:ext uri="{FF2B5EF4-FFF2-40B4-BE49-F238E27FC236}">
+                  <a16:creationId xmlns:a16="http://schemas.microsoft.com/office/drawing/2014/main" id="{9F708EBE-3154-4FF4-8E8F-88A076208068}"/>
+                </a:ext>
+                <a:ext uri="{C183D7F6-B498-43B3-948B-1728B52AA6E4}">
+                  <adec:decorative xmlns:adec="http://schemas.microsoft.com/office/drawing/2017/decorative" val="1"/>
+                </a:ext>
+              </a:extLst>
+            </p:cNvPr>
+            <p:cNvCxnSpPr>
+              <a:cxnSpLocks/>
+            </p:cNvCxnSpPr>
+            <p:nvPr>
+              <p:extLst>
+                <p:ext uri="{386F3935-93C4-4BCD-93E2-E3B085C9AB24}">
+                  <p16:designElem xmlns:p16="http://schemas.microsoft.com/office/powerpoint/2015/main" val="1"/>
+                </p:ext>
+              </p:extLst>
+            </p:nvPr>
+          </p:nvCxnSpPr>
+          <p:spPr>
+            <a:xfrm>
+              <a:off x="0" y="171716"/>
+              <a:ext cx="12192000" cy="0"/>
+            </a:xfrm>
+            <a:prstGeom prst="line">
+              <a:avLst/>
+            </a:prstGeom>
+            <a:ln w="12700">
+              <a:solidFill>
+                <a:srgbClr val="BCBCBC">
+                  <a:alpha val="29804"/>
+                </a:srgbClr>
+              </a:solidFill>
+              <a:prstDash val="sysDot"/>
+            </a:ln>
+          </p:spPr>
+          <p:style>
+            <a:lnRef idx="1">
+              <a:schemeClr val="accent1"/>
+            </a:lnRef>
+            <a:fillRef idx="0">
+              <a:schemeClr val="accent1"/>
+            </a:fillRef>
+            <a:effectRef idx="0">
+              <a:schemeClr val="accent1"/>
+            </a:effectRef>
+            <a:fontRef idx="minor">
+              <a:schemeClr val="tx1"/>
+            </a:fontRef>
+          </p:style>
+        </p:cxnSp>
+        <p:cxnSp>
+          <p:nvCxnSpPr>
+            <p:cNvPr id="29" name="Straight Connector 28">
+              <a:extLst>
+                <a:ext uri="{FF2B5EF4-FFF2-40B4-BE49-F238E27FC236}">
+                  <a16:creationId xmlns:a16="http://schemas.microsoft.com/office/drawing/2014/main" id="{27A99B5C-EB03-4D56-8DFE-B006D7081B61}"/>
+                </a:ext>
+                <a:ext uri="{C183D7F6-B498-43B3-948B-1728B52AA6E4}">
+                  <adec:decorative xmlns:adec="http://schemas.microsoft.com/office/drawing/2017/decorative" val="1"/>
+                </a:ext>
+              </a:extLst>
+            </p:cNvPr>
+            <p:cNvCxnSpPr>
+              <a:cxnSpLocks/>
+            </p:cNvCxnSpPr>
+            <p:nvPr>
+              <p:extLst>
+                <p:ext uri="{386F3935-93C4-4BCD-93E2-E3B085C9AB24}">
+                  <p16:designElem xmlns:p16="http://schemas.microsoft.com/office/powerpoint/2015/main" val="1"/>
+                </p:ext>
+              </p:extLst>
+            </p:nvPr>
+          </p:nvCxnSpPr>
+          <p:spPr>
+            <a:xfrm>
+              <a:off x="0" y="714597"/>
+              <a:ext cx="12192000" cy="0"/>
+            </a:xfrm>
+            <a:prstGeom prst="line">
+              <a:avLst/>
+            </a:prstGeom>
+            <a:ln w="12700">
+              <a:solidFill>
+                <a:srgbClr val="BCBCBC">
+                  <a:alpha val="29804"/>
+                </a:srgbClr>
+              </a:solidFill>
+              <a:prstDash val="sysDot"/>
+            </a:ln>
+          </p:spPr>
+          <p:style>
+            <a:lnRef idx="1">
+              <a:schemeClr val="accent1"/>
+            </a:lnRef>
+            <a:fillRef idx="0">
+              <a:schemeClr val="accent1"/>
+            </a:fillRef>
+            <a:effectRef idx="0">
+              <a:schemeClr val="accent1"/>
+            </a:effectRef>
+            <a:fontRef idx="minor">
+              <a:schemeClr val="tx1"/>
+            </a:fontRef>
+          </p:style>
+        </p:cxnSp>
+        <p:cxnSp>
+          <p:nvCxnSpPr>
+            <p:cNvPr id="30" name="Straight Connector 29">
+              <a:extLst>
+                <a:ext uri="{FF2B5EF4-FFF2-40B4-BE49-F238E27FC236}">
+                  <a16:creationId xmlns:a16="http://schemas.microsoft.com/office/drawing/2014/main" id="{2FCBAFF0-9FB4-4160-B9BE-CCBE1D8B8CBD}"/>
+                </a:ext>
+                <a:ext uri="{C183D7F6-B498-43B3-948B-1728B52AA6E4}">
+                  <adec:decorative xmlns:adec="http://schemas.microsoft.com/office/drawing/2017/decorative" val="1"/>
+                </a:ext>
+              </a:extLst>
+            </p:cNvPr>
+            <p:cNvCxnSpPr>
+              <a:cxnSpLocks/>
+            </p:cNvCxnSpPr>
+            <p:nvPr>
+              <p:extLst>
+                <p:ext uri="{386F3935-93C4-4BCD-93E2-E3B085C9AB24}">
+                  <p16:designElem xmlns:p16="http://schemas.microsoft.com/office/powerpoint/2015/main" val="1"/>
+                </p:ext>
+              </p:extLst>
+            </p:nvPr>
+          </p:nvCxnSpPr>
+          <p:spPr>
+            <a:xfrm>
+              <a:off x="0" y="1257478"/>
+              <a:ext cx="12192000" cy="0"/>
+            </a:xfrm>
+            <a:prstGeom prst="line">
+              <a:avLst/>
+            </a:prstGeom>
+            <a:ln w="12700">
+              <a:solidFill>
+                <a:srgbClr val="BCBCBC">
+                  <a:alpha val="29804"/>
+                </a:srgbClr>
+              </a:solidFill>
+              <a:prstDash val="sysDot"/>
+            </a:ln>
+          </p:spPr>
+          <p:style>
+            <a:lnRef idx="1">
+              <a:schemeClr val="accent1"/>
+            </a:lnRef>
+            <a:fillRef idx="0">
+              <a:schemeClr val="accent1"/>
+            </a:fillRef>
+            <a:effectRef idx="0">
+              <a:schemeClr val="accent1"/>
+            </a:effectRef>
+            <a:fontRef idx="minor">
+              <a:schemeClr val="tx1"/>
+            </a:fontRef>
+          </p:style>
+        </p:cxnSp>
+        <p:cxnSp>
+          <p:nvCxnSpPr>
+            <p:cNvPr id="31" name="Straight Connector 30">
+              <a:extLst>
+                <a:ext uri="{FF2B5EF4-FFF2-40B4-BE49-F238E27FC236}">
+                  <a16:creationId xmlns:a16="http://schemas.microsoft.com/office/drawing/2014/main" id="{326953D7-154A-49A4-B2E1-D94D365EC461}"/>
+                </a:ext>
+                <a:ext uri="{C183D7F6-B498-43B3-948B-1728B52AA6E4}">
+                  <adec:decorative xmlns:adec="http://schemas.microsoft.com/office/drawing/2017/decorative" val="1"/>
+                </a:ext>
+              </a:extLst>
+            </p:cNvPr>
+            <p:cNvCxnSpPr>
+              <a:cxnSpLocks/>
+            </p:cNvCxnSpPr>
+            <p:nvPr>
+              <p:extLst>
+                <p:ext uri="{386F3935-93C4-4BCD-93E2-E3B085C9AB24}">
+                  <p16:designElem xmlns:p16="http://schemas.microsoft.com/office/powerpoint/2015/main" val="1"/>
+                </p:ext>
+              </p:extLst>
+            </p:nvPr>
+          </p:nvCxnSpPr>
+          <p:spPr>
+            <a:xfrm>
+              <a:off x="0" y="1800359"/>
+              <a:ext cx="12192000" cy="0"/>
+            </a:xfrm>
+            <a:prstGeom prst="line">
+              <a:avLst/>
+            </a:prstGeom>
+            <a:ln w="12700">
+              <a:solidFill>
+                <a:srgbClr val="BCBCBC">
+                  <a:alpha val="29804"/>
+                </a:srgbClr>
+              </a:solidFill>
+              <a:prstDash val="sysDot"/>
+            </a:ln>
+          </p:spPr>
+          <p:style>
+            <a:lnRef idx="1">
+              <a:schemeClr val="accent1"/>
+            </a:lnRef>
+            <a:fillRef idx="0">
+              <a:schemeClr val="accent1"/>
+            </a:fillRef>
+            <a:effectRef idx="0">
+              <a:schemeClr val="accent1"/>
+            </a:effectRef>
+            <a:fontRef idx="minor">
+              <a:schemeClr val="tx1"/>
+            </a:fontRef>
+          </p:style>
+        </p:cxnSp>
+        <p:cxnSp>
+          <p:nvCxnSpPr>
+            <p:cNvPr id="32" name="Straight Connector 31">
+              <a:extLst>
+                <a:ext uri="{FF2B5EF4-FFF2-40B4-BE49-F238E27FC236}">
+                  <a16:creationId xmlns:a16="http://schemas.microsoft.com/office/drawing/2014/main" id="{836E3E12-5D96-48DB-8320-6294287740AC}"/>
+                </a:ext>
+                <a:ext uri="{C183D7F6-B498-43B3-948B-1728B52AA6E4}">
+                  <adec:decorative xmlns:adec="http://schemas.microsoft.com/office/drawing/2017/decorative" val="1"/>
+                </a:ext>
+              </a:extLst>
+            </p:cNvPr>
+            <p:cNvCxnSpPr>
+              <a:cxnSpLocks/>
+            </p:cNvCxnSpPr>
+            <p:nvPr>
+              <p:extLst>
+                <p:ext uri="{386F3935-93C4-4BCD-93E2-E3B085C9AB24}">
+                  <p16:designElem xmlns:p16="http://schemas.microsoft.com/office/powerpoint/2015/main" val="1"/>
+                </p:ext>
+              </p:extLst>
+            </p:nvPr>
+          </p:nvCxnSpPr>
+          <p:spPr>
+            <a:xfrm>
+              <a:off x="0" y="2343240"/>
+              <a:ext cx="12192000" cy="0"/>
+            </a:xfrm>
+            <a:prstGeom prst="line">
+              <a:avLst/>
+            </a:prstGeom>
+            <a:ln w="12700">
+              <a:solidFill>
+                <a:srgbClr val="BCBCBC">
+                  <a:alpha val="29804"/>
+                </a:srgbClr>
+              </a:solidFill>
+              <a:prstDash val="sysDot"/>
+            </a:ln>
+          </p:spPr>
+          <p:style>
+            <a:lnRef idx="1">
+              <a:schemeClr val="accent1"/>
+            </a:lnRef>
+            <a:fillRef idx="0">
+              <a:schemeClr val="accent1"/>
+            </a:fillRef>
+            <a:effectRef idx="0">
+              <a:schemeClr val="accent1"/>
+            </a:effectRef>
+            <a:fontRef idx="minor">
+              <a:schemeClr val="tx1"/>
+            </a:fontRef>
+          </p:style>
+        </p:cxnSp>
+        <p:cxnSp>
+          <p:nvCxnSpPr>
+            <p:cNvPr id="33" name="Straight Connector 32">
+              <a:extLst>
+                <a:ext uri="{FF2B5EF4-FFF2-40B4-BE49-F238E27FC236}">
+                  <a16:creationId xmlns:a16="http://schemas.microsoft.com/office/drawing/2014/main" id="{7A059482-79BA-4E80-80A2-36FD8408DA34}"/>
+                </a:ext>
+                <a:ext uri="{C183D7F6-B498-43B3-948B-1728B52AA6E4}">
+                  <adec:decorative xmlns:adec="http://schemas.microsoft.com/office/drawing/2017/decorative" val="1"/>
+                </a:ext>
+              </a:extLst>
+            </p:cNvPr>
+            <p:cNvCxnSpPr>
+              <a:cxnSpLocks/>
+            </p:cNvCxnSpPr>
+            <p:nvPr>
+              <p:extLst>
+                <p:ext uri="{386F3935-93C4-4BCD-93E2-E3B085C9AB24}">
+                  <p16:designElem xmlns:p16="http://schemas.microsoft.com/office/powerpoint/2015/main" val="1"/>
+                </p:ext>
+              </p:extLst>
+            </p:nvPr>
+          </p:nvCxnSpPr>
+          <p:spPr>
+            <a:xfrm>
+              <a:off x="0" y="2886121"/>
+              <a:ext cx="12192000" cy="0"/>
+            </a:xfrm>
+            <a:prstGeom prst="line">
+              <a:avLst/>
+            </a:prstGeom>
+            <a:ln w="12700">
+              <a:solidFill>
+                <a:srgbClr val="BCBCBC">
+                  <a:alpha val="29804"/>
+                </a:srgbClr>
+              </a:solidFill>
+              <a:prstDash val="sysDot"/>
+            </a:ln>
+          </p:spPr>
+          <p:style>
+            <a:lnRef idx="1">
+              <a:schemeClr val="accent1"/>
+            </a:lnRef>
+            <a:fillRef idx="0">
+              <a:schemeClr val="accent1"/>
+            </a:fillRef>
+            <a:effectRef idx="0">
+              <a:schemeClr val="accent1"/>
+            </a:effectRef>
+            <a:fontRef idx="minor">
+              <a:schemeClr val="tx1"/>
+            </a:fontRef>
+          </p:style>
+        </p:cxnSp>
+        <p:cxnSp>
+          <p:nvCxnSpPr>
+            <p:cNvPr id="34" name="Straight Connector 33">
+              <a:extLst>
+                <a:ext uri="{FF2B5EF4-FFF2-40B4-BE49-F238E27FC236}">
+                  <a16:creationId xmlns:a16="http://schemas.microsoft.com/office/drawing/2014/main" id="{B4EF88B3-C210-433D-B20D-FE41B4D5F936}"/>
+                </a:ext>
+                <a:ext uri="{C183D7F6-B498-43B3-948B-1728B52AA6E4}">
+                  <adec:decorative xmlns:adec="http://schemas.microsoft.com/office/drawing/2017/decorative" val="1"/>
+                </a:ext>
+              </a:extLst>
+            </p:cNvPr>
+            <p:cNvCxnSpPr>
+              <a:cxnSpLocks/>
+            </p:cNvCxnSpPr>
+            <p:nvPr>
+              <p:extLst>
+                <p:ext uri="{386F3935-93C4-4BCD-93E2-E3B085C9AB24}">
+                  <p16:designElem xmlns:p16="http://schemas.microsoft.com/office/powerpoint/2015/main" val="1"/>
+                </p:ext>
+              </p:extLst>
+            </p:nvPr>
+          </p:nvCxnSpPr>
+          <p:spPr>
+            <a:xfrm>
+              <a:off x="0" y="3429002"/>
+              <a:ext cx="12192000" cy="0"/>
+            </a:xfrm>
+            <a:prstGeom prst="line">
+              <a:avLst/>
+            </a:prstGeom>
+            <a:ln w="12700">
+              <a:solidFill>
+                <a:srgbClr val="BCBCBC">
+                  <a:alpha val="29804"/>
+                </a:srgbClr>
+              </a:solidFill>
+              <a:prstDash val="sysDot"/>
+            </a:ln>
+          </p:spPr>
+          <p:style>
+            <a:lnRef idx="1">
+              <a:schemeClr val="accent1"/>
+            </a:lnRef>
+            <a:fillRef idx="0">
+              <a:schemeClr val="accent1"/>
+            </a:fillRef>
+            <a:effectRef idx="0">
+              <a:schemeClr val="accent1"/>
+            </a:effectRef>
+            <a:fontRef idx="minor">
+              <a:schemeClr val="tx1"/>
+            </a:fontRef>
+          </p:style>
+        </p:cxnSp>
+        <p:cxnSp>
+          <p:nvCxnSpPr>
+            <p:cNvPr id="35" name="Straight Connector 34">
+              <a:extLst>
+                <a:ext uri="{FF2B5EF4-FFF2-40B4-BE49-F238E27FC236}">
+                  <a16:creationId xmlns:a16="http://schemas.microsoft.com/office/drawing/2014/main" id="{53665D3E-61E7-4EDF-A208-56449D765C62}"/>
+                </a:ext>
+                <a:ext uri="{C183D7F6-B498-43B3-948B-1728B52AA6E4}">
+                  <adec:decorative xmlns:adec="http://schemas.microsoft.com/office/drawing/2017/decorative" val="1"/>
+                </a:ext>
+              </a:extLst>
+            </p:cNvPr>
+            <p:cNvCxnSpPr>
+              <a:cxnSpLocks/>
+            </p:cNvCxnSpPr>
+            <p:nvPr>
+              <p:extLst>
+                <p:ext uri="{386F3935-93C4-4BCD-93E2-E3B085C9AB24}">
+                  <p16:designElem xmlns:p16="http://schemas.microsoft.com/office/powerpoint/2015/main" val="1"/>
+                </p:ext>
+              </p:extLst>
+            </p:nvPr>
+          </p:nvCxnSpPr>
+          <p:spPr>
+            <a:xfrm>
+              <a:off x="0" y="3971883"/>
+              <a:ext cx="12192000" cy="0"/>
+            </a:xfrm>
+            <a:prstGeom prst="line">
+              <a:avLst/>
+            </a:prstGeom>
+            <a:ln w="12700">
+              <a:solidFill>
+                <a:srgbClr val="BCBCBC">
+                  <a:alpha val="29804"/>
+                </a:srgbClr>
+              </a:solidFill>
+              <a:prstDash val="sysDot"/>
+            </a:ln>
+          </p:spPr>
+          <p:style>
+            <a:lnRef idx="1">
+              <a:schemeClr val="accent1"/>
+            </a:lnRef>
+            <a:fillRef idx="0">
+              <a:schemeClr val="accent1"/>
+            </a:fillRef>
+            <a:effectRef idx="0">
+              <a:schemeClr val="accent1"/>
+            </a:effectRef>
+            <a:fontRef idx="minor">
+              <a:schemeClr val="tx1"/>
+            </a:fontRef>
+          </p:style>
+        </p:cxnSp>
+        <p:cxnSp>
+          <p:nvCxnSpPr>
+            <p:cNvPr id="36" name="Straight Connector 35">
+              <a:extLst>
+                <a:ext uri="{FF2B5EF4-FFF2-40B4-BE49-F238E27FC236}">
+                  <a16:creationId xmlns:a16="http://schemas.microsoft.com/office/drawing/2014/main" id="{874CF3B0-C9C3-4683-94A3-DC0AE1E74512}"/>
+                </a:ext>
+                <a:ext uri="{C183D7F6-B498-43B3-948B-1728B52AA6E4}">
+                  <adec:decorative xmlns:adec="http://schemas.microsoft.com/office/drawing/2017/decorative" val="1"/>
+                </a:ext>
+              </a:extLst>
+            </p:cNvPr>
+            <p:cNvCxnSpPr>
+              <a:cxnSpLocks/>
+            </p:cNvCxnSpPr>
+            <p:nvPr>
+              <p:extLst>
+                <p:ext uri="{386F3935-93C4-4BCD-93E2-E3B085C9AB24}">
+                  <p16:designElem xmlns:p16="http://schemas.microsoft.com/office/powerpoint/2015/main" val="1"/>
+                </p:ext>
+              </p:extLst>
+            </p:nvPr>
+          </p:nvCxnSpPr>
+          <p:spPr>
+            <a:xfrm>
+              <a:off x="0" y="4514764"/>
+              <a:ext cx="12192000" cy="0"/>
+            </a:xfrm>
+            <a:prstGeom prst="line">
+              <a:avLst/>
+            </a:prstGeom>
+            <a:ln w="12700">
+              <a:solidFill>
+                <a:srgbClr val="BCBCBC">
+                  <a:alpha val="29804"/>
+                </a:srgbClr>
+              </a:solidFill>
+              <a:prstDash val="sysDot"/>
+            </a:ln>
+          </p:spPr>
+          <p:style>
+            <a:lnRef idx="1">
+              <a:schemeClr val="accent1"/>
+            </a:lnRef>
+            <a:fillRef idx="0">
+              <a:schemeClr val="accent1"/>
+            </a:fillRef>
+            <a:effectRef idx="0">
+              <a:schemeClr val="accent1"/>
+            </a:effectRef>
+            <a:fontRef idx="minor">
+              <a:schemeClr val="tx1"/>
+            </a:fontRef>
+          </p:style>
+        </p:cxnSp>
+        <p:cxnSp>
+          <p:nvCxnSpPr>
+            <p:cNvPr id="37" name="Straight Connector 36">
+              <a:extLst>
+                <a:ext uri="{FF2B5EF4-FFF2-40B4-BE49-F238E27FC236}">
+                  <a16:creationId xmlns:a16="http://schemas.microsoft.com/office/drawing/2014/main" id="{7BE90EF9-6DF5-47F4-A069-9F613C81422A}"/>
+                </a:ext>
+                <a:ext uri="{C183D7F6-B498-43B3-948B-1728B52AA6E4}">
+                  <adec:decorative xmlns:adec="http://schemas.microsoft.com/office/drawing/2017/decorative" val="1"/>
+                </a:ext>
+              </a:extLst>
+            </p:cNvPr>
+            <p:cNvCxnSpPr>
+              <a:cxnSpLocks/>
+            </p:cNvCxnSpPr>
+            <p:nvPr>
+              <p:extLst>
+                <p:ext uri="{386F3935-93C4-4BCD-93E2-E3B085C9AB24}">
+                  <p16:designElem xmlns:p16="http://schemas.microsoft.com/office/powerpoint/2015/main" val="1"/>
+                </p:ext>
+              </p:extLst>
+            </p:nvPr>
+          </p:nvCxnSpPr>
+          <p:spPr>
+            <a:xfrm>
+              <a:off x="0" y="5057645"/>
+              <a:ext cx="12192000" cy="0"/>
+            </a:xfrm>
+            <a:prstGeom prst="line">
+              <a:avLst/>
+            </a:prstGeom>
+            <a:ln w="12700">
+              <a:solidFill>
+                <a:srgbClr val="BCBCBC">
+                  <a:alpha val="29804"/>
+                </a:srgbClr>
+              </a:solidFill>
+              <a:prstDash val="sysDot"/>
+            </a:ln>
+          </p:spPr>
+          <p:style>
+            <a:lnRef idx="1">
+              <a:schemeClr val="accent1"/>
+            </a:lnRef>
+            <a:fillRef idx="0">
+              <a:schemeClr val="accent1"/>
+            </a:fillRef>
+            <a:effectRef idx="0">
+              <a:schemeClr val="accent1"/>
+            </a:effectRef>
+            <a:fontRef idx="minor">
+              <a:schemeClr val="tx1"/>
+            </a:fontRef>
+          </p:style>
+        </p:cxnSp>
+        <p:cxnSp>
+          <p:nvCxnSpPr>
+            <p:cNvPr id="38" name="Straight Connector 37">
+              <a:extLst>
+                <a:ext uri="{FF2B5EF4-FFF2-40B4-BE49-F238E27FC236}">
+                  <a16:creationId xmlns:a16="http://schemas.microsoft.com/office/drawing/2014/main" id="{F844EBDE-5A9F-4E9F-8A55-57FB9E979798}"/>
+                </a:ext>
+                <a:ext uri="{C183D7F6-B498-43B3-948B-1728B52AA6E4}">
+                  <adec:decorative xmlns:adec="http://schemas.microsoft.com/office/drawing/2017/decorative" val="1"/>
+                </a:ext>
+              </a:extLst>
+            </p:cNvPr>
+            <p:cNvCxnSpPr>
+              <a:cxnSpLocks/>
+            </p:cNvCxnSpPr>
+            <p:nvPr>
+              <p:extLst>
+                <p:ext uri="{386F3935-93C4-4BCD-93E2-E3B085C9AB24}">
+                  <p16:designElem xmlns:p16="http://schemas.microsoft.com/office/powerpoint/2015/main" val="1"/>
+                </p:ext>
+              </p:extLst>
+            </p:nvPr>
+          </p:nvCxnSpPr>
+          <p:spPr>
+            <a:xfrm>
+              <a:off x="0" y="5600526"/>
+              <a:ext cx="12192000" cy="0"/>
+            </a:xfrm>
+            <a:prstGeom prst="line">
+              <a:avLst/>
+            </a:prstGeom>
+            <a:ln w="12700">
+              <a:solidFill>
+                <a:srgbClr val="BCBCBC">
+                  <a:alpha val="29804"/>
+                </a:srgbClr>
+              </a:solidFill>
+              <a:prstDash val="sysDot"/>
+            </a:ln>
+          </p:spPr>
+          <p:style>
+            <a:lnRef idx="1">
+              <a:schemeClr val="accent1"/>
+            </a:lnRef>
+            <a:fillRef idx="0">
+              <a:schemeClr val="accent1"/>
+            </a:fillRef>
+            <a:effectRef idx="0">
+              <a:schemeClr val="accent1"/>
+            </a:effectRef>
+            <a:fontRef idx="minor">
+              <a:schemeClr val="tx1"/>
+            </a:fontRef>
+          </p:style>
+        </p:cxnSp>
+        <p:cxnSp>
+          <p:nvCxnSpPr>
+            <p:cNvPr id="39" name="Straight Connector 38">
+              <a:extLst>
+                <a:ext uri="{FF2B5EF4-FFF2-40B4-BE49-F238E27FC236}">
+                  <a16:creationId xmlns:a16="http://schemas.microsoft.com/office/drawing/2014/main" id="{6491FC45-82C4-40CD-8D0C-0A2F86E8A1EE}"/>
+                </a:ext>
+                <a:ext uri="{C183D7F6-B498-43B3-948B-1728B52AA6E4}">
+                  <adec:decorative xmlns:adec="http://schemas.microsoft.com/office/drawing/2017/decorative" val="1"/>
+                </a:ext>
+              </a:extLst>
+            </p:cNvPr>
+            <p:cNvCxnSpPr>
+              <a:cxnSpLocks/>
+            </p:cNvCxnSpPr>
+            <p:nvPr>
+              <p:extLst>
+                <p:ext uri="{386F3935-93C4-4BCD-93E2-E3B085C9AB24}">
+                  <p16:designElem xmlns:p16="http://schemas.microsoft.com/office/powerpoint/2015/main" val="1"/>
+                </p:ext>
+              </p:extLst>
+            </p:nvPr>
+          </p:nvCxnSpPr>
+          <p:spPr>
+            <a:xfrm>
+              <a:off x="0" y="6857999"/>
+              <a:ext cx="12192000" cy="0"/>
+            </a:xfrm>
+            <a:prstGeom prst="line">
+              <a:avLst/>
+            </a:prstGeom>
+            <a:ln w="12700">
+              <a:solidFill>
+                <a:srgbClr val="BCBCBC">
+                  <a:alpha val="29804"/>
+                </a:srgbClr>
+              </a:solidFill>
+              <a:prstDash val="sysDot"/>
+            </a:ln>
+          </p:spPr>
+          <p:style>
+            <a:lnRef idx="1">
+              <a:schemeClr val="accent1"/>
+            </a:lnRef>
+            <a:fillRef idx="0">
+              <a:schemeClr val="accent1"/>
+            </a:fillRef>
+            <a:effectRef idx="0">
+              <a:schemeClr val="accent1"/>
+            </a:effectRef>
+            <a:fontRef idx="minor">
+              <a:schemeClr val="tx1"/>
+            </a:fontRef>
+          </p:style>
+        </p:cxnSp>
+        <p:cxnSp>
+          <p:nvCxnSpPr>
+            <p:cNvPr id="40" name="Straight Connector 39">
+              <a:extLst>
+                <a:ext uri="{FF2B5EF4-FFF2-40B4-BE49-F238E27FC236}">
+                  <a16:creationId xmlns:a16="http://schemas.microsoft.com/office/drawing/2014/main" id="{71AD0FE3-6144-4171-943E-0E65D08E806C}"/>
+                </a:ext>
+                <a:ext uri="{C183D7F6-B498-43B3-948B-1728B52AA6E4}">
+                  <adec:decorative xmlns:adec="http://schemas.microsoft.com/office/drawing/2017/decorative" val="1"/>
+                </a:ext>
+              </a:extLst>
+            </p:cNvPr>
+            <p:cNvCxnSpPr>
+              <a:cxnSpLocks/>
+            </p:cNvCxnSpPr>
+            <p:nvPr>
+              <p:extLst>
+                <p:ext uri="{386F3935-93C4-4BCD-93E2-E3B085C9AB24}">
+                  <p16:designElem xmlns:p16="http://schemas.microsoft.com/office/powerpoint/2015/main" val="1"/>
+                </p:ext>
+              </p:extLst>
+            </p:nvPr>
+          </p:nvCxnSpPr>
+          <p:spPr>
+            <a:xfrm>
+              <a:off x="16613" y="6143407"/>
+              <a:ext cx="12192000" cy="0"/>
+            </a:xfrm>
+            <a:prstGeom prst="line">
+              <a:avLst/>
+            </a:prstGeom>
+            <a:ln w="12700">
+              <a:solidFill>
+                <a:srgbClr val="BCBCBC">
+                  <a:alpha val="29804"/>
+                </a:srgbClr>
+              </a:solidFill>
+              <a:prstDash val="sysDot"/>
+            </a:ln>
+          </p:spPr>
+          <p:style>
+            <a:lnRef idx="1">
+              <a:schemeClr val="accent1"/>
+            </a:lnRef>
+            <a:fillRef idx="0">
+              <a:schemeClr val="accent1"/>
+            </a:fillRef>
+            <a:effectRef idx="0">
+              <a:schemeClr val="accent1"/>
+            </a:effectRef>
+            <a:fontRef idx="minor">
+              <a:schemeClr val="tx1"/>
+            </a:fontRef>
+          </p:style>
+        </p:cxnSp>
+        <p:cxnSp>
+          <p:nvCxnSpPr>
+            <p:cNvPr id="41" name="Straight Connector 40">
+              <a:extLst>
+                <a:ext uri="{FF2B5EF4-FFF2-40B4-BE49-F238E27FC236}">
+                  <a16:creationId xmlns:a16="http://schemas.microsoft.com/office/drawing/2014/main" id="{A7BA4499-5E6A-4998-A0F4-614E65552B8C}"/>
+                </a:ext>
+                <a:ext uri="{C183D7F6-B498-43B3-948B-1728B52AA6E4}">
+                  <adec:decorative xmlns:adec="http://schemas.microsoft.com/office/drawing/2017/decorative" val="1"/>
+                </a:ext>
+              </a:extLst>
+            </p:cNvPr>
+            <p:cNvCxnSpPr>
+              <a:cxnSpLocks/>
+            </p:cNvCxnSpPr>
+            <p:nvPr>
+              <p:extLst>
+                <p:ext uri="{386F3935-93C4-4BCD-93E2-E3B085C9AB24}">
+                  <p16:designElem xmlns:p16="http://schemas.microsoft.com/office/powerpoint/2015/main" val="1"/>
+                </p:ext>
+              </p:extLst>
+            </p:nvPr>
+          </p:nvCxnSpPr>
+          <p:spPr>
+            <a:xfrm>
+              <a:off x="684225" y="171716"/>
+              <a:ext cx="0" cy="6511464"/>
+            </a:xfrm>
+            <a:prstGeom prst="line">
+              <a:avLst/>
+            </a:prstGeom>
+            <a:ln w="12700">
+              <a:solidFill>
+                <a:srgbClr val="BCBCBC">
+                  <a:alpha val="29804"/>
+                </a:srgbClr>
+              </a:solidFill>
+              <a:prstDash val="sysDot"/>
+            </a:ln>
+          </p:spPr>
+          <p:style>
+            <a:lnRef idx="1">
+              <a:schemeClr val="accent1"/>
+            </a:lnRef>
+            <a:fillRef idx="0">
+              <a:schemeClr val="accent1"/>
+            </a:fillRef>
+            <a:effectRef idx="0">
+              <a:schemeClr val="accent1"/>
+            </a:effectRef>
+            <a:fontRef idx="minor">
+              <a:schemeClr val="tx1"/>
+            </a:fontRef>
+          </p:style>
+        </p:cxnSp>
+        <p:cxnSp>
+          <p:nvCxnSpPr>
+            <p:cNvPr id="42" name="Straight Connector 41">
+              <a:extLst>
+                <a:ext uri="{FF2B5EF4-FFF2-40B4-BE49-F238E27FC236}">
+                  <a16:creationId xmlns:a16="http://schemas.microsoft.com/office/drawing/2014/main" id="{CAFE7A6F-A7F0-4406-809F-E23FCB201E3B}"/>
+                </a:ext>
+                <a:ext uri="{C183D7F6-B498-43B3-948B-1728B52AA6E4}">
+                  <adec:decorative xmlns:adec="http://schemas.microsoft.com/office/drawing/2017/decorative" val="1"/>
+                </a:ext>
+              </a:extLst>
+            </p:cNvPr>
+            <p:cNvCxnSpPr>
+              <a:cxnSpLocks/>
+            </p:cNvCxnSpPr>
+            <p:nvPr>
+              <p:extLst>
+                <p:ext uri="{386F3935-93C4-4BCD-93E2-E3B085C9AB24}">
+                  <p16:designElem xmlns:p16="http://schemas.microsoft.com/office/powerpoint/2015/main" val="1"/>
+                </p:ext>
+              </p:extLst>
+            </p:nvPr>
+          </p:nvCxnSpPr>
+          <p:spPr>
+            <a:xfrm>
+              <a:off x="11508412" y="173267"/>
+              <a:ext cx="0" cy="6511464"/>
+            </a:xfrm>
+            <a:prstGeom prst="line">
+              <a:avLst/>
+            </a:prstGeom>
+            <a:ln w="12700">
+              <a:solidFill>
+                <a:srgbClr val="BCBCBC">
+                  <a:alpha val="29804"/>
+                </a:srgbClr>
+              </a:solidFill>
+              <a:prstDash val="sysDot"/>
+            </a:ln>
+          </p:spPr>
+          <p:style>
+            <a:lnRef idx="1">
+              <a:schemeClr val="accent1"/>
+            </a:lnRef>
+            <a:fillRef idx="0">
+              <a:schemeClr val="accent1"/>
+            </a:fillRef>
+            <a:effectRef idx="0">
+              <a:schemeClr val="accent1"/>
+            </a:effectRef>
+            <a:fontRef idx="minor">
+              <a:schemeClr val="tx1"/>
+            </a:fontRef>
+          </p:style>
+        </p:cxnSp>
+      </p:grpSp>
       <p:sp>
         <p:nvSpPr>
           <p:cNvPr id="2" name="Título 1">
             <a:extLst>
               <a:ext uri="{FF2B5EF4-FFF2-40B4-BE49-F238E27FC236}">
-                <a16:creationId xmlns:a16="http://schemas.microsoft.com/office/drawing/2014/main" id="{070BAD8B-A56C-C3ED-F177-EABEA98B06EF}"/>
+                <a16:creationId xmlns:a16="http://schemas.microsoft.com/office/drawing/2014/main" id="{907DFE90-C241-CE5A-2785-B1C467D5769A}"/>
               </a:ext>
             </a:extLst>
           </p:cNvPr>
@@ -24889,48 +26698,197 @@
             <p:ph type="title"/>
           </p:nvPr>
         </p:nvSpPr>
-        <p:spPr/>
+        <p:spPr>
+          <a:xfrm>
+            <a:off x="6088653" y="725951"/>
+            <a:ext cx="4927425" cy="1938525"/>
+          </a:xfrm>
+        </p:spPr>
         <p:txBody>
-          <a:bodyPr/>
+          <a:bodyPr>
+            <a:normAutofit/>
+          </a:bodyPr>
           <a:lstStyle/>
           <a:p>
             <a:r>
               <a:rPr lang="pt-BR" dirty="0"/>
-              <a:t>Ferramentas utilizadas</a:t>
+              <a:t>Cenário do fato</a:t>
             </a:r>
           </a:p>
         </p:txBody>
       </p:sp>
-      <p:graphicFrame>
-        <p:nvGraphicFramePr>
-          <p:cNvPr id="5" name="Espaço Reservado para Conteúdo 2">
+      <p:pic>
+        <p:nvPicPr>
+          <p:cNvPr id="48" name="Picture 4" descr="Gráficos financeiros em uma tela escura">
             <a:extLst>
               <a:ext uri="{FF2B5EF4-FFF2-40B4-BE49-F238E27FC236}">
-                <a16:creationId xmlns:a16="http://schemas.microsoft.com/office/drawing/2014/main" id="{494C3890-3F75-87DA-3B77-BD4895D93632}"/>
+                <a16:creationId xmlns:a16="http://schemas.microsoft.com/office/drawing/2014/main" id="{A70FCE05-8874-50C3-55EF-1E8A90AC5AE1}"/>
               </a:ext>
             </a:extLst>
           </p:cNvPr>
-          <p:cNvGraphicFramePr>
-            <a:graphicFrameLocks noGrp="1"/>
-          </p:cNvGraphicFramePr>
+          <p:cNvPicPr>
+            <a:picLocks noChangeAspect="1"/>
+          </p:cNvPicPr>
+          <p:nvPr/>
+        </p:nvPicPr>
+        <p:blipFill rotWithShape="1">
+          <a:blip r:embed="rId2"/>
+          <a:srcRect l="20417" r="26225"/>
+          <a:stretch/>
+        </p:blipFill>
+        <p:spPr>
+          <a:xfrm>
+            <a:off x="1" y="10"/>
+            <a:ext cx="5854890" cy="6857990"/>
+          </a:xfrm>
+          <a:custGeom>
+            <a:avLst/>
+            <a:gdLst/>
+            <a:ahLst/>
+            <a:cxnLst/>
+            <a:rect l="l" t="t" r="r" b="b"/>
+            <a:pathLst>
+              <a:path w="6036633" h="6858000">
+                <a:moveTo>
+                  <a:pt x="0" y="0"/>
+                </a:moveTo>
+                <a:lnTo>
+                  <a:pt x="5782584" y="0"/>
+                </a:lnTo>
+                <a:lnTo>
+                  <a:pt x="5847735" y="280891"/>
+                </a:lnTo>
+                <a:cubicBezTo>
+                  <a:pt x="6512611" y="3337011"/>
+                  <a:pt x="5215360" y="3533975"/>
+                  <a:pt x="5130974" y="6590095"/>
+                </a:cubicBezTo>
+                <a:lnTo>
+                  <a:pt x="5127340" y="6858000"/>
+                </a:lnTo>
+                <a:lnTo>
+                  <a:pt x="0" y="6858000"/>
+                </a:lnTo>
+                <a:close/>
+              </a:path>
+            </a:pathLst>
+          </a:custGeom>
+        </p:spPr>
+      </p:pic>
+      <p:sp>
+        <p:nvSpPr>
+          <p:cNvPr id="49" name="Right Triangle 43">
+            <a:extLst>
+              <a:ext uri="{FF2B5EF4-FFF2-40B4-BE49-F238E27FC236}">
+                <a16:creationId xmlns:a16="http://schemas.microsoft.com/office/drawing/2014/main" id="{BEAC0A80-07D3-49CB-87C3-BC34F219DFF7}"/>
+              </a:ext>
+              <a:ext uri="{C183D7F6-B498-43B3-948B-1728B52AA6E4}">
+                <adec:decorative xmlns:adec="http://schemas.microsoft.com/office/drawing/2017/decorative" val="1"/>
+              </a:ext>
+            </a:extLst>
+          </p:cNvPr>
+          <p:cNvSpPr>
+            <a:spLocks noGrp="1" noRot="1" noChangeAspect="1" noMove="1" noResize="1" noEditPoints="1" noAdjustHandles="1" noChangeArrowheads="1" noChangeShapeType="1" noTextEdit="1"/>
+          </p:cNvSpPr>
+          <p:nvPr>
+            <p:extLst>
+              <p:ext uri="{386F3935-93C4-4BCD-93E2-E3B085C9AB24}">
+                <p16:designElem xmlns:p16="http://schemas.microsoft.com/office/powerpoint/2015/main" val="1"/>
+              </p:ext>
+            </p:extLst>
+          </p:nvPr>
+        </p:nvSpPr>
+        <p:spPr>
+          <a:xfrm rot="18900000">
+            <a:off x="6297339" y="-292624"/>
+            <a:ext cx="568289" cy="568289"/>
+          </a:xfrm>
+          <a:prstGeom prst="rtTriangle">
+            <a:avLst/>
+          </a:prstGeom>
+          <a:solidFill>
+            <a:schemeClr val="accent1">
+              <a:alpha val="50000"/>
+            </a:schemeClr>
+          </a:solidFill>
+          <a:ln>
+            <a:noFill/>
+          </a:ln>
+        </p:spPr>
+        <p:style>
+          <a:lnRef idx="2">
+            <a:schemeClr val="accent1">
+              <a:shade val="50000"/>
+            </a:schemeClr>
+          </a:lnRef>
+          <a:fillRef idx="1">
+            <a:schemeClr val="accent1"/>
+          </a:fillRef>
+          <a:effectRef idx="0">
+            <a:schemeClr val="accent1"/>
+          </a:effectRef>
+          <a:fontRef idx="minor">
+            <a:schemeClr val="lt1"/>
+          </a:fontRef>
+        </p:style>
+        <p:txBody>
+          <a:bodyPr rtlCol="0" anchor="ctr"/>
+          <a:lstStyle/>
+          <a:p>
+            <a:pPr algn="ctr"/>
+            <a:endParaRPr lang="en-US">
+              <a:solidFill>
+                <a:schemeClr val="tx1"/>
+              </a:solidFill>
+            </a:endParaRPr>
+          </a:p>
+        </p:txBody>
+      </p:sp>
+      <p:sp>
+        <p:nvSpPr>
+          <p:cNvPr id="3" name="Espaço Reservado para Conteúdo 2">
+            <a:extLst>
+              <a:ext uri="{FF2B5EF4-FFF2-40B4-BE49-F238E27FC236}">
+                <a16:creationId xmlns:a16="http://schemas.microsoft.com/office/drawing/2014/main" id="{CF427797-2CD8-578C-7494-8399C0518688}"/>
+              </a:ext>
+            </a:extLst>
+          </p:cNvPr>
+          <p:cNvSpPr>
+            <a:spLocks noGrp="1"/>
+          </p:cNvSpPr>
           <p:nvPr>
             <p:ph idx="1"/>
           </p:nvPr>
-        </p:nvGraphicFramePr>
-        <p:xfrm>
-          <a:off x="691079" y="2340131"/>
-          <a:ext cx="10325000" cy="3564436"/>
-        </p:xfrm>
-        <a:graphic>
-          <a:graphicData uri="http://schemas.openxmlformats.org/drawingml/2006/diagram">
-            <dgm:relIds xmlns:dgm="http://schemas.openxmlformats.org/drawingml/2006/diagram" xmlns:r="http://schemas.openxmlformats.org/officeDocument/2006/relationships" r:dm="rId2" r:lo="rId3" r:qs="rId4" r:cs="rId5"/>
-          </a:graphicData>
-        </a:graphic>
-      </p:graphicFrame>
+        </p:nvSpPr>
+        <p:spPr>
+          <a:xfrm>
+            <a:off x="6088653" y="2886116"/>
+            <a:ext cx="4927425" cy="3245931"/>
+          </a:xfrm>
+        </p:spPr>
+        <p:txBody>
+          <a:bodyPr>
+            <a:normAutofit/>
+          </a:bodyPr>
+          <a:lstStyle/>
+          <a:p>
+            <a:pPr marL="0" indent="0">
+              <a:lnSpc>
+                <a:spcPct val="100000"/>
+              </a:lnSpc>
+              <a:buNone/>
+            </a:pPr>
+            <a:r>
+              <a:rPr lang="pt-BR" sz="1700" dirty="0"/>
+              <a:t>Sabemos que muitas pessoas no Brasil foram infectadas pelo vírus do corona, mas talvez muita gente não saiba qual locais houveram mais infecções. Diante disso criamos uma tabela fato que mostra ordenadamente pela total de casos confirmados em determinada cidade, junto com o estado, a data inicial que começou, a data final do último resultado coletado, além dos totais de mortes e a média dos casos confirmados por 100 mil habitantes</a:t>
+            </a:r>
+          </a:p>
+        </p:txBody>
+      </p:sp>
     </p:spTree>
     <p:extLst>
       <p:ext uri="{BB962C8B-B14F-4D97-AF65-F5344CB8AC3E}">
-        <p14:creationId xmlns:p14="http://schemas.microsoft.com/office/powerpoint/2010/main" val="2512264200"/>
+        <p14:creationId xmlns:p14="http://schemas.microsoft.com/office/powerpoint/2010/main" val="426408020"/>
       </p:ext>
     </p:extLst>
   </p:cSld>
@@ -26974,6 +28932,90 @@
 </file>
 
 <file path=ppt/slides/slide4.xml><?xml version="1.0" encoding="utf-8"?>
+<p:sld xmlns:a="http://schemas.openxmlformats.org/drawingml/2006/main" xmlns:r="http://schemas.openxmlformats.org/officeDocument/2006/relationships" xmlns:p="http://schemas.openxmlformats.org/presentationml/2006/main">
+  <p:cSld>
+    <p:spTree>
+      <p:nvGrpSpPr>
+        <p:cNvPr id="1" name=""/>
+        <p:cNvGrpSpPr/>
+        <p:nvPr/>
+      </p:nvGrpSpPr>
+      <p:grpSpPr>
+        <a:xfrm>
+          <a:off x="0" y="0"/>
+          <a:ext cx="0" cy="0"/>
+          <a:chOff x="0" y="0"/>
+          <a:chExt cx="0" cy="0"/>
+        </a:xfrm>
+      </p:grpSpPr>
+      <p:sp>
+        <p:nvSpPr>
+          <p:cNvPr id="2" name="Título 1">
+            <a:extLst>
+              <a:ext uri="{FF2B5EF4-FFF2-40B4-BE49-F238E27FC236}">
+                <a16:creationId xmlns:a16="http://schemas.microsoft.com/office/drawing/2014/main" id="{070BAD8B-A56C-C3ED-F177-EABEA98B06EF}"/>
+              </a:ext>
+            </a:extLst>
+          </p:cNvPr>
+          <p:cNvSpPr>
+            <a:spLocks noGrp="1"/>
+          </p:cNvSpPr>
+          <p:nvPr>
+            <p:ph type="title"/>
+          </p:nvPr>
+        </p:nvSpPr>
+        <p:spPr/>
+        <p:txBody>
+          <a:bodyPr/>
+          <a:lstStyle/>
+          <a:p>
+            <a:r>
+              <a:rPr lang="pt-BR" dirty="0"/>
+              <a:t>Ferramentas utilizadas</a:t>
+            </a:r>
+          </a:p>
+        </p:txBody>
+      </p:sp>
+      <p:graphicFrame>
+        <p:nvGraphicFramePr>
+          <p:cNvPr id="5" name="Espaço Reservado para Conteúdo 2">
+            <a:extLst>
+              <a:ext uri="{FF2B5EF4-FFF2-40B4-BE49-F238E27FC236}">
+                <a16:creationId xmlns:a16="http://schemas.microsoft.com/office/drawing/2014/main" id="{494C3890-3F75-87DA-3B77-BD4895D93632}"/>
+              </a:ext>
+            </a:extLst>
+          </p:cNvPr>
+          <p:cNvGraphicFramePr>
+            <a:graphicFrameLocks noGrp="1"/>
+          </p:cNvGraphicFramePr>
+          <p:nvPr>
+            <p:ph idx="1"/>
+          </p:nvPr>
+        </p:nvGraphicFramePr>
+        <p:xfrm>
+          <a:off x="691079" y="2340131"/>
+          <a:ext cx="10325000" cy="3564436"/>
+        </p:xfrm>
+        <a:graphic>
+          <a:graphicData uri="http://schemas.openxmlformats.org/drawingml/2006/diagram">
+            <dgm:relIds xmlns:dgm="http://schemas.openxmlformats.org/drawingml/2006/diagram" xmlns:r="http://schemas.openxmlformats.org/officeDocument/2006/relationships" r:dm="rId2" r:lo="rId3" r:qs="rId4" r:cs="rId5"/>
+          </a:graphicData>
+        </a:graphic>
+      </p:graphicFrame>
+    </p:spTree>
+    <p:extLst>
+      <p:ext uri="{BB962C8B-B14F-4D97-AF65-F5344CB8AC3E}">
+        <p14:creationId xmlns:p14="http://schemas.microsoft.com/office/powerpoint/2010/main" val="2512264200"/>
+      </p:ext>
+    </p:extLst>
+  </p:cSld>
+  <p:clrMapOvr>
+    <a:masterClrMapping/>
+  </p:clrMapOvr>
+</p:sld>
+</file>
+
+<file path=ppt/slides/slide5.xml><?xml version="1.0" encoding="utf-8"?>
 <p:sld xmlns:a="http://schemas.openxmlformats.org/drawingml/2006/main" xmlns:r="http://schemas.openxmlformats.org/officeDocument/2006/relationships" xmlns:p="http://schemas.openxmlformats.org/presentationml/2006/main">
   <p:cSld>
     <p:bg>
@@ -29211,2048 +31253,6 @@
     <p:extLst>
       <p:ext uri="{BB962C8B-B14F-4D97-AF65-F5344CB8AC3E}">
         <p14:creationId xmlns:p14="http://schemas.microsoft.com/office/powerpoint/2010/main" val="2062277511"/>
-      </p:ext>
-    </p:extLst>
-  </p:cSld>
-  <p:clrMapOvr>
-    <a:masterClrMapping/>
-  </p:clrMapOvr>
-</p:sld>
-</file>
-
-<file path=ppt/slides/slide5.xml><?xml version="1.0" encoding="utf-8"?>
-<p:sld xmlns:a="http://schemas.openxmlformats.org/drawingml/2006/main" xmlns:r="http://schemas.openxmlformats.org/officeDocument/2006/relationships" xmlns:p="http://schemas.openxmlformats.org/presentationml/2006/main">
-  <p:cSld>
-    <p:bg>
-      <p:bgPr>
-        <a:solidFill>
-          <a:schemeClr val="bg1"/>
-        </a:solidFill>
-        <a:effectLst/>
-      </p:bgPr>
-    </p:bg>
-    <p:spTree>
-      <p:nvGrpSpPr>
-        <p:cNvPr id="1" name=""/>
-        <p:cNvGrpSpPr/>
-        <p:nvPr/>
-      </p:nvGrpSpPr>
-      <p:grpSpPr>
-        <a:xfrm>
-          <a:off x="0" y="0"/>
-          <a:ext cx="0" cy="0"/>
-          <a:chOff x="0" y="0"/>
-          <a:chExt cx="0" cy="0"/>
-        </a:xfrm>
-      </p:grpSpPr>
-      <p:sp useBgFill="1">
-        <p:nvSpPr>
-          <p:cNvPr id="46" name="Rectangle 8">
-            <a:extLst>
-              <a:ext uri="{FF2B5EF4-FFF2-40B4-BE49-F238E27FC236}">
-                <a16:creationId xmlns:a16="http://schemas.microsoft.com/office/drawing/2014/main" id="{1C582B07-D0F0-4B6B-A5D9-D2F192CB3A4E}"/>
-              </a:ext>
-              <a:ext uri="{C183D7F6-B498-43B3-948B-1728B52AA6E4}">
-                <adec:decorative xmlns:adec="http://schemas.microsoft.com/office/drawing/2017/decorative" val="1"/>
-              </a:ext>
-            </a:extLst>
-          </p:cNvPr>
-          <p:cNvSpPr>
-            <a:spLocks noGrp="1" noRot="1" noChangeAspect="1" noMove="1" noResize="1" noEditPoints="1" noAdjustHandles="1" noChangeArrowheads="1" noChangeShapeType="1" noTextEdit="1"/>
-          </p:cNvSpPr>
-          <p:nvPr>
-            <p:extLst>
-              <p:ext uri="{386F3935-93C4-4BCD-93E2-E3B085C9AB24}">
-                <p16:designElem xmlns:p16="http://schemas.microsoft.com/office/powerpoint/2015/main" val="1"/>
-              </p:ext>
-            </p:extLst>
-          </p:nvPr>
-        </p:nvSpPr>
-        <p:spPr>
-          <a:xfrm>
-            <a:off x="0" y="0"/>
-            <a:ext cx="12188952" cy="6858000"/>
-          </a:xfrm>
-          <a:prstGeom prst="rect">
-            <a:avLst/>
-          </a:prstGeom>
-          <a:ln>
-            <a:noFill/>
-          </a:ln>
-        </p:spPr>
-        <p:style>
-          <a:lnRef idx="2">
-            <a:schemeClr val="accent1">
-              <a:shade val="50000"/>
-            </a:schemeClr>
-          </a:lnRef>
-          <a:fillRef idx="1">
-            <a:schemeClr val="accent1"/>
-          </a:fillRef>
-          <a:effectRef idx="0">
-            <a:schemeClr val="accent1"/>
-          </a:effectRef>
-          <a:fontRef idx="minor">
-            <a:schemeClr val="lt1"/>
-          </a:fontRef>
-        </p:style>
-        <p:txBody>
-          <a:bodyPr rtlCol="0" anchor="ctr"/>
-          <a:lstStyle/>
-          <a:p>
-            <a:pPr algn="ctr"/>
-            <a:endParaRPr lang="en-US">
-              <a:solidFill>
-                <a:schemeClr val="bg1"/>
-              </a:solidFill>
-            </a:endParaRPr>
-          </a:p>
-        </p:txBody>
-      </p:sp>
-      <p:grpSp>
-        <p:nvGrpSpPr>
-          <p:cNvPr id="47" name="Group 10">
-            <a:extLst>
-              <a:ext uri="{FF2B5EF4-FFF2-40B4-BE49-F238E27FC236}">
-                <a16:creationId xmlns:a16="http://schemas.microsoft.com/office/drawing/2014/main" id="{4D431671-5191-4947-8899-E90505A70426}"/>
-              </a:ext>
-              <a:ext uri="{C183D7F6-B498-43B3-948B-1728B52AA6E4}">
-                <adec:decorative xmlns:adec="http://schemas.microsoft.com/office/drawing/2017/decorative" val="1"/>
-              </a:ext>
-            </a:extLst>
-          </p:cNvPr>
-          <p:cNvGrpSpPr>
-            <a:grpSpLocks noGrp="1" noUngrp="1" noRot="1" noChangeAspect="1" noMove="1" noResize="1"/>
-          </p:cNvGrpSpPr>
-          <p:nvPr>
-            <p:extLst>
-              <p:ext uri="{386F3935-93C4-4BCD-93E2-E3B085C9AB24}">
-                <p16:designElem xmlns:p16="http://schemas.microsoft.com/office/powerpoint/2015/main" val="1"/>
-              </p:ext>
-            </p:extLst>
-          </p:nvPr>
-        </p:nvGrpSpPr>
-        <p:grpSpPr>
-          <a:xfrm>
-            <a:off x="-6214" y="-1"/>
-            <a:ext cx="12214827" cy="6858000"/>
-            <a:chOff x="-6214" y="-1"/>
-            <a:chExt cx="12214827" cy="6858000"/>
-          </a:xfrm>
-        </p:grpSpPr>
-        <p:cxnSp>
-          <p:nvCxnSpPr>
-            <p:cNvPr id="12" name="Straight Connector 11">
-              <a:extLst>
-                <a:ext uri="{FF2B5EF4-FFF2-40B4-BE49-F238E27FC236}">
-                  <a16:creationId xmlns:a16="http://schemas.microsoft.com/office/drawing/2014/main" id="{877D2E98-ED65-4121-9DA5-6DBB831D0FB2}"/>
-                </a:ext>
-                <a:ext uri="{C183D7F6-B498-43B3-948B-1728B52AA6E4}">
-                  <adec:decorative xmlns:adec="http://schemas.microsoft.com/office/drawing/2017/decorative" val="1"/>
-                </a:ext>
-              </a:extLst>
-            </p:cNvPr>
-            <p:cNvCxnSpPr>
-              <a:cxnSpLocks/>
-            </p:cNvCxnSpPr>
-            <p:nvPr>
-              <p:extLst>
-                <p:ext uri="{386F3935-93C4-4BCD-93E2-E3B085C9AB24}">
-                  <p16:designElem xmlns:p16="http://schemas.microsoft.com/office/powerpoint/2015/main" val="1"/>
-                </p:ext>
-              </p:extLst>
-            </p:nvPr>
-          </p:nvCxnSpPr>
-          <p:spPr>
-            <a:xfrm>
-              <a:off x="-6214" y="6686283"/>
-              <a:ext cx="12192000" cy="0"/>
-            </a:xfrm>
-            <a:prstGeom prst="line">
-              <a:avLst/>
-            </a:prstGeom>
-            <a:ln w="12700">
-              <a:solidFill>
-                <a:srgbClr val="BCBCBC">
-                  <a:alpha val="29804"/>
-                </a:srgbClr>
-              </a:solidFill>
-              <a:prstDash val="sysDot"/>
-            </a:ln>
-          </p:spPr>
-          <p:style>
-            <a:lnRef idx="1">
-              <a:schemeClr val="accent1"/>
-            </a:lnRef>
-            <a:fillRef idx="0">
-              <a:schemeClr val="accent1"/>
-            </a:fillRef>
-            <a:effectRef idx="0">
-              <a:schemeClr val="accent1"/>
-            </a:effectRef>
-            <a:fontRef idx="minor">
-              <a:schemeClr val="tx1"/>
-            </a:fontRef>
-          </p:style>
-        </p:cxnSp>
-        <p:cxnSp>
-          <p:nvCxnSpPr>
-            <p:cNvPr id="13" name="Straight Connector 12">
-              <a:extLst>
-                <a:ext uri="{FF2B5EF4-FFF2-40B4-BE49-F238E27FC236}">
-                  <a16:creationId xmlns:a16="http://schemas.microsoft.com/office/drawing/2014/main" id="{DA94A307-5B5D-4E42-95B3-064D5093ADE5}"/>
-                </a:ext>
-                <a:ext uri="{C183D7F6-B498-43B3-948B-1728B52AA6E4}">
-                  <adec:decorative xmlns:adec="http://schemas.microsoft.com/office/drawing/2017/decorative" val="1"/>
-                </a:ext>
-              </a:extLst>
-            </p:cNvPr>
-            <p:cNvCxnSpPr>
-              <a:cxnSpLocks/>
-            </p:cNvCxnSpPr>
-            <p:nvPr>
-              <p:extLst>
-                <p:ext uri="{386F3935-93C4-4BCD-93E2-E3B085C9AB24}">
-                  <p16:designElem xmlns:p16="http://schemas.microsoft.com/office/powerpoint/2015/main" val="1"/>
-                </p:ext>
-              </p:extLst>
-            </p:nvPr>
-          </p:nvCxnSpPr>
-          <p:spPr>
-            <a:xfrm>
-              <a:off x="0" y="-1"/>
-              <a:ext cx="0" cy="6858000"/>
-            </a:xfrm>
-            <a:prstGeom prst="line">
-              <a:avLst/>
-            </a:prstGeom>
-            <a:ln w="12700">
-              <a:solidFill>
-                <a:srgbClr val="BCBCBC">
-                  <a:alpha val="29804"/>
-                </a:srgbClr>
-              </a:solidFill>
-              <a:prstDash val="sysDot"/>
-            </a:ln>
-          </p:spPr>
-          <p:style>
-            <a:lnRef idx="1">
-              <a:schemeClr val="accent1"/>
-            </a:lnRef>
-            <a:fillRef idx="0">
-              <a:schemeClr val="accent1"/>
-            </a:fillRef>
-            <a:effectRef idx="0">
-              <a:schemeClr val="accent1"/>
-            </a:effectRef>
-            <a:fontRef idx="minor">
-              <a:schemeClr val="tx1"/>
-            </a:fontRef>
-          </p:style>
-        </p:cxnSp>
-        <p:cxnSp>
-          <p:nvCxnSpPr>
-            <p:cNvPr id="14" name="Straight Connector 13">
-              <a:extLst>
-                <a:ext uri="{FF2B5EF4-FFF2-40B4-BE49-F238E27FC236}">
-                  <a16:creationId xmlns:a16="http://schemas.microsoft.com/office/drawing/2014/main" id="{8CB3B32C-3BDA-4D41-9802-681B0599FD3C}"/>
-                </a:ext>
-                <a:ext uri="{C183D7F6-B498-43B3-948B-1728B52AA6E4}">
-                  <adec:decorative xmlns:adec="http://schemas.microsoft.com/office/drawing/2017/decorative" val="1"/>
-                </a:ext>
-              </a:extLst>
-            </p:cNvPr>
-            <p:cNvCxnSpPr>
-              <a:cxnSpLocks/>
-            </p:cNvCxnSpPr>
-            <p:nvPr>
-              <p:extLst>
-                <p:ext uri="{386F3935-93C4-4BCD-93E2-E3B085C9AB24}">
-                  <p16:designElem xmlns:p16="http://schemas.microsoft.com/office/powerpoint/2015/main" val="1"/>
-                </p:ext>
-              </p:extLst>
-            </p:nvPr>
-          </p:nvCxnSpPr>
-          <p:spPr>
-            <a:xfrm>
-              <a:off x="11993258" y="-1"/>
-              <a:ext cx="0" cy="6858000"/>
-            </a:xfrm>
-            <a:prstGeom prst="line">
-              <a:avLst/>
-            </a:prstGeom>
-            <a:ln w="12700">
-              <a:solidFill>
-                <a:srgbClr val="BCBCBC">
-                  <a:alpha val="29804"/>
-                </a:srgbClr>
-              </a:solidFill>
-              <a:prstDash val="sysDot"/>
-            </a:ln>
-          </p:spPr>
-          <p:style>
-            <a:lnRef idx="1">
-              <a:schemeClr val="accent1"/>
-            </a:lnRef>
-            <a:fillRef idx="0">
-              <a:schemeClr val="accent1"/>
-            </a:fillRef>
-            <a:effectRef idx="0">
-              <a:schemeClr val="accent1"/>
-            </a:effectRef>
-            <a:fontRef idx="minor">
-              <a:schemeClr val="tx1"/>
-            </a:fontRef>
-          </p:style>
-        </p:cxnSp>
-        <p:cxnSp>
-          <p:nvCxnSpPr>
-            <p:cNvPr id="15" name="Straight Connector 14">
-              <a:extLst>
-                <a:ext uri="{FF2B5EF4-FFF2-40B4-BE49-F238E27FC236}">
-                  <a16:creationId xmlns:a16="http://schemas.microsoft.com/office/drawing/2014/main" id="{35BDBFD6-7C61-4520-8203-BAB1986C158C}"/>
-                </a:ext>
-                <a:ext uri="{C183D7F6-B498-43B3-948B-1728B52AA6E4}">
-                  <adec:decorative xmlns:adec="http://schemas.microsoft.com/office/drawing/2017/decorative" val="1"/>
-                </a:ext>
-              </a:extLst>
-            </p:cNvPr>
-            <p:cNvCxnSpPr>
-              <a:cxnSpLocks/>
-            </p:cNvCxnSpPr>
-            <p:nvPr>
-              <p:extLst>
-                <p:ext uri="{386F3935-93C4-4BCD-93E2-E3B085C9AB24}">
-                  <p16:designElem xmlns:p16="http://schemas.microsoft.com/office/powerpoint/2015/main" val="1"/>
-                </p:ext>
-              </p:extLst>
-            </p:nvPr>
-          </p:nvCxnSpPr>
-          <p:spPr>
-            <a:xfrm>
-              <a:off x="192528" y="-1"/>
-              <a:ext cx="0" cy="6858000"/>
-            </a:xfrm>
-            <a:prstGeom prst="line">
-              <a:avLst/>
-            </a:prstGeom>
-            <a:ln w="12700">
-              <a:solidFill>
-                <a:srgbClr val="BCBCBC">
-                  <a:alpha val="29804"/>
-                </a:srgbClr>
-              </a:solidFill>
-              <a:prstDash val="sysDot"/>
-            </a:ln>
-          </p:spPr>
-          <p:style>
-            <a:lnRef idx="1">
-              <a:schemeClr val="accent1"/>
-            </a:lnRef>
-            <a:fillRef idx="0">
-              <a:schemeClr val="accent1"/>
-            </a:fillRef>
-            <a:effectRef idx="0">
-              <a:schemeClr val="accent1"/>
-            </a:effectRef>
-            <a:fontRef idx="minor">
-              <a:schemeClr val="tx1"/>
-            </a:fontRef>
-          </p:style>
-        </p:cxnSp>
-        <p:cxnSp>
-          <p:nvCxnSpPr>
-            <p:cNvPr id="16" name="Straight Connector 15">
-              <a:extLst>
-                <a:ext uri="{FF2B5EF4-FFF2-40B4-BE49-F238E27FC236}">
-                  <a16:creationId xmlns:a16="http://schemas.microsoft.com/office/drawing/2014/main" id="{D4ABA4D7-9904-42C4-B0CD-B1CE2E0D3734}"/>
-                </a:ext>
-                <a:ext uri="{C183D7F6-B498-43B3-948B-1728B52AA6E4}">
-                  <adec:decorative xmlns:adec="http://schemas.microsoft.com/office/drawing/2017/decorative" val="1"/>
-                </a:ext>
-              </a:extLst>
-            </p:cNvPr>
-            <p:cNvCxnSpPr>
-              <a:cxnSpLocks/>
-            </p:cNvCxnSpPr>
-            <p:nvPr>
-              <p:extLst>
-                <p:ext uri="{386F3935-93C4-4BCD-93E2-E3B085C9AB24}">
-                  <p16:designElem xmlns:p16="http://schemas.microsoft.com/office/powerpoint/2015/main" val="1"/>
-                </p:ext>
-              </p:extLst>
-            </p:nvPr>
-          </p:nvCxnSpPr>
-          <p:spPr>
-            <a:xfrm>
-              <a:off x="1175922" y="-1"/>
-              <a:ext cx="0" cy="6858000"/>
-            </a:xfrm>
-            <a:prstGeom prst="line">
-              <a:avLst/>
-            </a:prstGeom>
-            <a:ln w="12700">
-              <a:solidFill>
-                <a:srgbClr val="BCBCBC">
-                  <a:alpha val="29804"/>
-                </a:srgbClr>
-              </a:solidFill>
-              <a:prstDash val="sysDot"/>
-            </a:ln>
-          </p:spPr>
-          <p:style>
-            <a:lnRef idx="1">
-              <a:schemeClr val="accent1"/>
-            </a:lnRef>
-            <a:fillRef idx="0">
-              <a:schemeClr val="accent1"/>
-            </a:fillRef>
-            <a:effectRef idx="0">
-              <a:schemeClr val="accent1"/>
-            </a:effectRef>
-            <a:fontRef idx="minor">
-              <a:schemeClr val="tx1"/>
-            </a:fontRef>
-          </p:style>
-        </p:cxnSp>
-        <p:cxnSp>
-          <p:nvCxnSpPr>
-            <p:cNvPr id="17" name="Straight Connector 16">
-              <a:extLst>
-                <a:ext uri="{FF2B5EF4-FFF2-40B4-BE49-F238E27FC236}">
-                  <a16:creationId xmlns:a16="http://schemas.microsoft.com/office/drawing/2014/main" id="{BB63F0D6-8747-4126-9359-B730EB21B79A}"/>
-                </a:ext>
-                <a:ext uri="{C183D7F6-B498-43B3-948B-1728B52AA6E4}">
-                  <adec:decorative xmlns:adec="http://schemas.microsoft.com/office/drawing/2017/decorative" val="1"/>
-                </a:ext>
-              </a:extLst>
-            </p:cNvPr>
-            <p:cNvCxnSpPr>
-              <a:cxnSpLocks/>
-            </p:cNvCxnSpPr>
-            <p:nvPr>
-              <p:extLst>
-                <p:ext uri="{386F3935-93C4-4BCD-93E2-E3B085C9AB24}">
-                  <p16:designElem xmlns:p16="http://schemas.microsoft.com/office/powerpoint/2015/main" val="1"/>
-                </p:ext>
-              </p:extLst>
-            </p:nvPr>
-          </p:nvCxnSpPr>
-          <p:spPr>
-            <a:xfrm>
-              <a:off x="2159316" y="-1"/>
-              <a:ext cx="0" cy="6858000"/>
-            </a:xfrm>
-            <a:prstGeom prst="line">
-              <a:avLst/>
-            </a:prstGeom>
-            <a:ln w="12700">
-              <a:solidFill>
-                <a:srgbClr val="BCBCBC">
-                  <a:alpha val="29804"/>
-                </a:srgbClr>
-              </a:solidFill>
-              <a:prstDash val="sysDot"/>
-            </a:ln>
-          </p:spPr>
-          <p:style>
-            <a:lnRef idx="1">
-              <a:schemeClr val="accent1"/>
-            </a:lnRef>
-            <a:fillRef idx="0">
-              <a:schemeClr val="accent1"/>
-            </a:fillRef>
-            <a:effectRef idx="0">
-              <a:schemeClr val="accent1"/>
-            </a:effectRef>
-            <a:fontRef idx="minor">
-              <a:schemeClr val="tx1"/>
-            </a:fontRef>
-          </p:style>
-        </p:cxnSp>
-        <p:cxnSp>
-          <p:nvCxnSpPr>
-            <p:cNvPr id="18" name="Straight Connector 17">
-              <a:extLst>
-                <a:ext uri="{FF2B5EF4-FFF2-40B4-BE49-F238E27FC236}">
-                  <a16:creationId xmlns:a16="http://schemas.microsoft.com/office/drawing/2014/main" id="{D91CD660-F5B2-49AC-9EFC-CE94B843B4DA}"/>
-                </a:ext>
-                <a:ext uri="{C183D7F6-B498-43B3-948B-1728B52AA6E4}">
-                  <adec:decorative xmlns:adec="http://schemas.microsoft.com/office/drawing/2017/decorative" val="1"/>
-                </a:ext>
-              </a:extLst>
-            </p:cNvPr>
-            <p:cNvCxnSpPr>
-              <a:cxnSpLocks/>
-            </p:cNvCxnSpPr>
-            <p:nvPr>
-              <p:extLst>
-                <p:ext uri="{386F3935-93C4-4BCD-93E2-E3B085C9AB24}">
-                  <p16:designElem xmlns:p16="http://schemas.microsoft.com/office/powerpoint/2015/main" val="1"/>
-                </p:ext>
-              </p:extLst>
-            </p:nvPr>
-          </p:nvCxnSpPr>
-          <p:spPr>
-            <a:xfrm>
-              <a:off x="3142710" y="-1"/>
-              <a:ext cx="0" cy="6858000"/>
-            </a:xfrm>
-            <a:prstGeom prst="line">
-              <a:avLst/>
-            </a:prstGeom>
-            <a:ln w="12700">
-              <a:solidFill>
-                <a:srgbClr val="BCBCBC">
-                  <a:alpha val="29804"/>
-                </a:srgbClr>
-              </a:solidFill>
-              <a:prstDash val="sysDot"/>
-            </a:ln>
-          </p:spPr>
-          <p:style>
-            <a:lnRef idx="1">
-              <a:schemeClr val="accent1"/>
-            </a:lnRef>
-            <a:fillRef idx="0">
-              <a:schemeClr val="accent1"/>
-            </a:fillRef>
-            <a:effectRef idx="0">
-              <a:schemeClr val="accent1"/>
-            </a:effectRef>
-            <a:fontRef idx="minor">
-              <a:schemeClr val="tx1"/>
-            </a:fontRef>
-          </p:style>
-        </p:cxnSp>
-        <p:cxnSp>
-          <p:nvCxnSpPr>
-            <p:cNvPr id="19" name="Straight Connector 18">
-              <a:extLst>
-                <a:ext uri="{FF2B5EF4-FFF2-40B4-BE49-F238E27FC236}">
-                  <a16:creationId xmlns:a16="http://schemas.microsoft.com/office/drawing/2014/main" id="{A4BEB7EB-8E7F-4A4B-8581-73CE2003F2F7}"/>
-                </a:ext>
-                <a:ext uri="{C183D7F6-B498-43B3-948B-1728B52AA6E4}">
-                  <adec:decorative xmlns:adec="http://schemas.microsoft.com/office/drawing/2017/decorative" val="1"/>
-                </a:ext>
-              </a:extLst>
-            </p:cNvPr>
-            <p:cNvCxnSpPr>
-              <a:cxnSpLocks/>
-            </p:cNvCxnSpPr>
-            <p:nvPr>
-              <p:extLst>
-                <p:ext uri="{386F3935-93C4-4BCD-93E2-E3B085C9AB24}">
-                  <p16:designElem xmlns:p16="http://schemas.microsoft.com/office/powerpoint/2015/main" val="1"/>
-                </p:ext>
-              </p:extLst>
-            </p:nvPr>
-          </p:nvCxnSpPr>
-          <p:spPr>
-            <a:xfrm>
-              <a:off x="4126104" y="-1"/>
-              <a:ext cx="0" cy="6858000"/>
-            </a:xfrm>
-            <a:prstGeom prst="line">
-              <a:avLst/>
-            </a:prstGeom>
-            <a:ln w="12700">
-              <a:solidFill>
-                <a:srgbClr val="BCBCBC">
-                  <a:alpha val="29804"/>
-                </a:srgbClr>
-              </a:solidFill>
-              <a:prstDash val="sysDot"/>
-            </a:ln>
-          </p:spPr>
-          <p:style>
-            <a:lnRef idx="1">
-              <a:schemeClr val="accent1"/>
-            </a:lnRef>
-            <a:fillRef idx="0">
-              <a:schemeClr val="accent1"/>
-            </a:fillRef>
-            <a:effectRef idx="0">
-              <a:schemeClr val="accent1"/>
-            </a:effectRef>
-            <a:fontRef idx="minor">
-              <a:schemeClr val="tx1"/>
-            </a:fontRef>
-          </p:style>
-        </p:cxnSp>
-        <p:cxnSp>
-          <p:nvCxnSpPr>
-            <p:cNvPr id="20" name="Straight Connector 19">
-              <a:extLst>
-                <a:ext uri="{FF2B5EF4-FFF2-40B4-BE49-F238E27FC236}">
-                  <a16:creationId xmlns:a16="http://schemas.microsoft.com/office/drawing/2014/main" id="{B04FB70E-6820-4456-872A-937F520606C5}"/>
-                </a:ext>
-                <a:ext uri="{C183D7F6-B498-43B3-948B-1728B52AA6E4}">
-                  <adec:decorative xmlns:adec="http://schemas.microsoft.com/office/drawing/2017/decorative" val="1"/>
-                </a:ext>
-              </a:extLst>
-            </p:cNvPr>
-            <p:cNvCxnSpPr>
-              <a:cxnSpLocks/>
-            </p:cNvCxnSpPr>
-            <p:nvPr>
-              <p:extLst>
-                <p:ext uri="{386F3935-93C4-4BCD-93E2-E3B085C9AB24}">
-                  <p16:designElem xmlns:p16="http://schemas.microsoft.com/office/powerpoint/2015/main" val="1"/>
-                </p:ext>
-              </p:extLst>
-            </p:nvPr>
-          </p:nvCxnSpPr>
-          <p:spPr>
-            <a:xfrm>
-              <a:off x="5109498" y="-1"/>
-              <a:ext cx="0" cy="6858000"/>
-            </a:xfrm>
-            <a:prstGeom prst="line">
-              <a:avLst/>
-            </a:prstGeom>
-            <a:ln w="12700">
-              <a:solidFill>
-                <a:srgbClr val="BCBCBC">
-                  <a:alpha val="29804"/>
-                </a:srgbClr>
-              </a:solidFill>
-              <a:prstDash val="sysDot"/>
-            </a:ln>
-          </p:spPr>
-          <p:style>
-            <a:lnRef idx="1">
-              <a:schemeClr val="accent1"/>
-            </a:lnRef>
-            <a:fillRef idx="0">
-              <a:schemeClr val="accent1"/>
-            </a:fillRef>
-            <a:effectRef idx="0">
-              <a:schemeClr val="accent1"/>
-            </a:effectRef>
-            <a:fontRef idx="minor">
-              <a:schemeClr val="tx1"/>
-            </a:fontRef>
-          </p:style>
-        </p:cxnSp>
-        <p:cxnSp>
-          <p:nvCxnSpPr>
-            <p:cNvPr id="21" name="Straight Connector 20">
-              <a:extLst>
-                <a:ext uri="{FF2B5EF4-FFF2-40B4-BE49-F238E27FC236}">
-                  <a16:creationId xmlns:a16="http://schemas.microsoft.com/office/drawing/2014/main" id="{E3598DD6-9887-4CF7-BAFE-F96E0324EB9E}"/>
-                </a:ext>
-                <a:ext uri="{C183D7F6-B498-43B3-948B-1728B52AA6E4}">
-                  <adec:decorative xmlns:adec="http://schemas.microsoft.com/office/drawing/2017/decorative" val="1"/>
-                </a:ext>
-              </a:extLst>
-            </p:cNvPr>
-            <p:cNvCxnSpPr>
-              <a:cxnSpLocks/>
-            </p:cNvCxnSpPr>
-            <p:nvPr>
-              <p:extLst>
-                <p:ext uri="{386F3935-93C4-4BCD-93E2-E3B085C9AB24}">
-                  <p16:designElem xmlns:p16="http://schemas.microsoft.com/office/powerpoint/2015/main" val="1"/>
-                </p:ext>
-              </p:extLst>
-            </p:nvPr>
-          </p:nvCxnSpPr>
-          <p:spPr>
-            <a:xfrm>
-              <a:off x="6092892" y="-1"/>
-              <a:ext cx="0" cy="6858000"/>
-            </a:xfrm>
-            <a:prstGeom prst="line">
-              <a:avLst/>
-            </a:prstGeom>
-            <a:ln w="12700">
-              <a:solidFill>
-                <a:srgbClr val="BCBCBC">
-                  <a:alpha val="29804"/>
-                </a:srgbClr>
-              </a:solidFill>
-              <a:prstDash val="sysDot"/>
-            </a:ln>
-          </p:spPr>
-          <p:style>
-            <a:lnRef idx="1">
-              <a:schemeClr val="accent1"/>
-            </a:lnRef>
-            <a:fillRef idx="0">
-              <a:schemeClr val="accent1"/>
-            </a:fillRef>
-            <a:effectRef idx="0">
-              <a:schemeClr val="accent1"/>
-            </a:effectRef>
-            <a:fontRef idx="minor">
-              <a:schemeClr val="tx1"/>
-            </a:fontRef>
-          </p:style>
-        </p:cxnSp>
-        <p:cxnSp>
-          <p:nvCxnSpPr>
-            <p:cNvPr id="22" name="Straight Connector 21">
-              <a:extLst>
-                <a:ext uri="{FF2B5EF4-FFF2-40B4-BE49-F238E27FC236}">
-                  <a16:creationId xmlns:a16="http://schemas.microsoft.com/office/drawing/2014/main" id="{AA503E64-565F-465B-A25C-042C5706C568}"/>
-                </a:ext>
-                <a:ext uri="{C183D7F6-B498-43B3-948B-1728B52AA6E4}">
-                  <adec:decorative xmlns:adec="http://schemas.microsoft.com/office/drawing/2017/decorative" val="1"/>
-                </a:ext>
-              </a:extLst>
-            </p:cNvPr>
-            <p:cNvCxnSpPr>
-              <a:cxnSpLocks/>
-            </p:cNvCxnSpPr>
-            <p:nvPr>
-              <p:extLst>
-                <p:ext uri="{386F3935-93C4-4BCD-93E2-E3B085C9AB24}">
-                  <p16:designElem xmlns:p16="http://schemas.microsoft.com/office/powerpoint/2015/main" val="1"/>
-                </p:ext>
-              </p:extLst>
-            </p:nvPr>
-          </p:nvCxnSpPr>
-          <p:spPr>
-            <a:xfrm>
-              <a:off x="7076286" y="-1"/>
-              <a:ext cx="0" cy="6858000"/>
-            </a:xfrm>
-            <a:prstGeom prst="line">
-              <a:avLst/>
-            </a:prstGeom>
-            <a:ln w="12700">
-              <a:solidFill>
-                <a:srgbClr val="BCBCBC">
-                  <a:alpha val="29804"/>
-                </a:srgbClr>
-              </a:solidFill>
-              <a:prstDash val="sysDot"/>
-            </a:ln>
-          </p:spPr>
-          <p:style>
-            <a:lnRef idx="1">
-              <a:schemeClr val="accent1"/>
-            </a:lnRef>
-            <a:fillRef idx="0">
-              <a:schemeClr val="accent1"/>
-            </a:fillRef>
-            <a:effectRef idx="0">
-              <a:schemeClr val="accent1"/>
-            </a:effectRef>
-            <a:fontRef idx="minor">
-              <a:schemeClr val="tx1"/>
-            </a:fontRef>
-          </p:style>
-        </p:cxnSp>
-        <p:cxnSp>
-          <p:nvCxnSpPr>
-            <p:cNvPr id="23" name="Straight Connector 22">
-              <a:extLst>
-                <a:ext uri="{FF2B5EF4-FFF2-40B4-BE49-F238E27FC236}">
-                  <a16:creationId xmlns:a16="http://schemas.microsoft.com/office/drawing/2014/main" id="{A140EE7B-5CA1-4DCB-8652-6E4D2147B0E7}"/>
-                </a:ext>
-                <a:ext uri="{C183D7F6-B498-43B3-948B-1728B52AA6E4}">
-                  <adec:decorative xmlns:adec="http://schemas.microsoft.com/office/drawing/2017/decorative" val="1"/>
-                </a:ext>
-              </a:extLst>
-            </p:cNvPr>
-            <p:cNvCxnSpPr>
-              <a:cxnSpLocks/>
-            </p:cNvCxnSpPr>
-            <p:nvPr>
-              <p:extLst>
-                <p:ext uri="{386F3935-93C4-4BCD-93E2-E3B085C9AB24}">
-                  <p16:designElem xmlns:p16="http://schemas.microsoft.com/office/powerpoint/2015/main" val="1"/>
-                </p:ext>
-              </p:extLst>
-            </p:nvPr>
-          </p:nvCxnSpPr>
-          <p:spPr>
-            <a:xfrm>
-              <a:off x="8059680" y="-1"/>
-              <a:ext cx="0" cy="6858000"/>
-            </a:xfrm>
-            <a:prstGeom prst="line">
-              <a:avLst/>
-            </a:prstGeom>
-            <a:ln w="12700">
-              <a:solidFill>
-                <a:srgbClr val="BCBCBC">
-                  <a:alpha val="29804"/>
-                </a:srgbClr>
-              </a:solidFill>
-              <a:prstDash val="sysDot"/>
-            </a:ln>
-          </p:spPr>
-          <p:style>
-            <a:lnRef idx="1">
-              <a:schemeClr val="accent1"/>
-            </a:lnRef>
-            <a:fillRef idx="0">
-              <a:schemeClr val="accent1"/>
-            </a:fillRef>
-            <a:effectRef idx="0">
-              <a:schemeClr val="accent1"/>
-            </a:effectRef>
-            <a:fontRef idx="minor">
-              <a:schemeClr val="tx1"/>
-            </a:fontRef>
-          </p:style>
-        </p:cxnSp>
-        <p:cxnSp>
-          <p:nvCxnSpPr>
-            <p:cNvPr id="24" name="Straight Connector 23">
-              <a:extLst>
-                <a:ext uri="{FF2B5EF4-FFF2-40B4-BE49-F238E27FC236}">
-                  <a16:creationId xmlns:a16="http://schemas.microsoft.com/office/drawing/2014/main" id="{F85077BE-700D-4C44-AA4D-7CF4E8FD71A9}"/>
-                </a:ext>
-                <a:ext uri="{C183D7F6-B498-43B3-948B-1728B52AA6E4}">
-                  <adec:decorative xmlns:adec="http://schemas.microsoft.com/office/drawing/2017/decorative" val="1"/>
-                </a:ext>
-              </a:extLst>
-            </p:cNvPr>
-            <p:cNvCxnSpPr>
-              <a:cxnSpLocks/>
-            </p:cNvCxnSpPr>
-            <p:nvPr>
-              <p:extLst>
-                <p:ext uri="{386F3935-93C4-4BCD-93E2-E3B085C9AB24}">
-                  <p16:designElem xmlns:p16="http://schemas.microsoft.com/office/powerpoint/2015/main" val="1"/>
-                </p:ext>
-              </p:extLst>
-            </p:nvPr>
-          </p:nvCxnSpPr>
-          <p:spPr>
-            <a:xfrm>
-              <a:off x="9043074" y="-1"/>
-              <a:ext cx="0" cy="6858000"/>
-            </a:xfrm>
-            <a:prstGeom prst="line">
-              <a:avLst/>
-            </a:prstGeom>
-            <a:ln w="12700">
-              <a:solidFill>
-                <a:srgbClr val="BCBCBC">
-                  <a:alpha val="29804"/>
-                </a:srgbClr>
-              </a:solidFill>
-              <a:prstDash val="sysDot"/>
-            </a:ln>
-          </p:spPr>
-          <p:style>
-            <a:lnRef idx="1">
-              <a:schemeClr val="accent1"/>
-            </a:lnRef>
-            <a:fillRef idx="0">
-              <a:schemeClr val="accent1"/>
-            </a:fillRef>
-            <a:effectRef idx="0">
-              <a:schemeClr val="accent1"/>
-            </a:effectRef>
-            <a:fontRef idx="minor">
-              <a:schemeClr val="tx1"/>
-            </a:fontRef>
-          </p:style>
-        </p:cxnSp>
-        <p:cxnSp>
-          <p:nvCxnSpPr>
-            <p:cNvPr id="25" name="Straight Connector 24">
-              <a:extLst>
-                <a:ext uri="{FF2B5EF4-FFF2-40B4-BE49-F238E27FC236}">
-                  <a16:creationId xmlns:a16="http://schemas.microsoft.com/office/drawing/2014/main" id="{FB8B3FEB-D353-443D-A148-3915606516D5}"/>
-                </a:ext>
-                <a:ext uri="{C183D7F6-B498-43B3-948B-1728B52AA6E4}">
-                  <adec:decorative xmlns:adec="http://schemas.microsoft.com/office/drawing/2017/decorative" val="1"/>
-                </a:ext>
-              </a:extLst>
-            </p:cNvPr>
-            <p:cNvCxnSpPr>
-              <a:cxnSpLocks/>
-            </p:cNvCxnSpPr>
-            <p:nvPr>
-              <p:extLst>
-                <p:ext uri="{386F3935-93C4-4BCD-93E2-E3B085C9AB24}">
-                  <p16:designElem xmlns:p16="http://schemas.microsoft.com/office/powerpoint/2015/main" val="1"/>
-                </p:ext>
-              </p:extLst>
-            </p:nvPr>
-          </p:nvCxnSpPr>
-          <p:spPr>
-            <a:xfrm>
-              <a:off x="10026468" y="-1"/>
-              <a:ext cx="0" cy="6858000"/>
-            </a:xfrm>
-            <a:prstGeom prst="line">
-              <a:avLst/>
-            </a:prstGeom>
-            <a:ln w="12700">
-              <a:solidFill>
-                <a:srgbClr val="BCBCBC">
-                  <a:alpha val="29804"/>
-                </a:srgbClr>
-              </a:solidFill>
-              <a:prstDash val="sysDot"/>
-            </a:ln>
-          </p:spPr>
-          <p:style>
-            <a:lnRef idx="1">
-              <a:schemeClr val="accent1"/>
-            </a:lnRef>
-            <a:fillRef idx="0">
-              <a:schemeClr val="accent1"/>
-            </a:fillRef>
-            <a:effectRef idx="0">
-              <a:schemeClr val="accent1"/>
-            </a:effectRef>
-            <a:fontRef idx="minor">
-              <a:schemeClr val="tx1"/>
-            </a:fontRef>
-          </p:style>
-        </p:cxnSp>
-        <p:cxnSp>
-          <p:nvCxnSpPr>
-            <p:cNvPr id="26" name="Straight Connector 25">
-              <a:extLst>
-                <a:ext uri="{FF2B5EF4-FFF2-40B4-BE49-F238E27FC236}">
-                  <a16:creationId xmlns:a16="http://schemas.microsoft.com/office/drawing/2014/main" id="{91FF5FBB-3BD8-46EB-BDF9-081B29A444BD}"/>
-                </a:ext>
-                <a:ext uri="{C183D7F6-B498-43B3-948B-1728B52AA6E4}">
-                  <adec:decorative xmlns:adec="http://schemas.microsoft.com/office/drawing/2017/decorative" val="1"/>
-                </a:ext>
-              </a:extLst>
-            </p:cNvPr>
-            <p:cNvCxnSpPr>
-              <a:cxnSpLocks/>
-            </p:cNvCxnSpPr>
-            <p:nvPr>
-              <p:extLst>
-                <p:ext uri="{386F3935-93C4-4BCD-93E2-E3B085C9AB24}">
-                  <p16:designElem xmlns:p16="http://schemas.microsoft.com/office/powerpoint/2015/main" val="1"/>
-                </p:ext>
-              </p:extLst>
-            </p:nvPr>
-          </p:nvCxnSpPr>
-          <p:spPr>
-            <a:xfrm>
-              <a:off x="11009862" y="-1"/>
-              <a:ext cx="0" cy="6858000"/>
-            </a:xfrm>
-            <a:prstGeom prst="line">
-              <a:avLst/>
-            </a:prstGeom>
-            <a:ln w="12700">
-              <a:solidFill>
-                <a:srgbClr val="BCBCBC">
-                  <a:alpha val="29804"/>
-                </a:srgbClr>
-              </a:solidFill>
-              <a:prstDash val="sysDot"/>
-            </a:ln>
-          </p:spPr>
-          <p:style>
-            <a:lnRef idx="1">
-              <a:schemeClr val="accent1"/>
-            </a:lnRef>
-            <a:fillRef idx="0">
-              <a:schemeClr val="accent1"/>
-            </a:fillRef>
-            <a:effectRef idx="0">
-              <a:schemeClr val="accent1"/>
-            </a:effectRef>
-            <a:fontRef idx="minor">
-              <a:schemeClr val="tx1"/>
-            </a:fontRef>
-          </p:style>
-        </p:cxnSp>
-        <p:cxnSp>
-          <p:nvCxnSpPr>
-            <p:cNvPr id="27" name="Straight Connector 26">
-              <a:extLst>
-                <a:ext uri="{FF2B5EF4-FFF2-40B4-BE49-F238E27FC236}">
-                  <a16:creationId xmlns:a16="http://schemas.microsoft.com/office/drawing/2014/main" id="{DC2E11FD-78A4-4F5C-A419-F0237DCAD274}"/>
-                </a:ext>
-                <a:ext uri="{C183D7F6-B498-43B3-948B-1728B52AA6E4}">
-                  <adec:decorative xmlns:adec="http://schemas.microsoft.com/office/drawing/2017/decorative" val="1"/>
-                </a:ext>
-              </a:extLst>
-            </p:cNvPr>
-            <p:cNvCxnSpPr>
-              <a:cxnSpLocks/>
-            </p:cNvCxnSpPr>
-            <p:nvPr>
-              <p:extLst>
-                <p:ext uri="{386F3935-93C4-4BCD-93E2-E3B085C9AB24}">
-                  <p16:designElem xmlns:p16="http://schemas.microsoft.com/office/powerpoint/2015/main" val="1"/>
-                </p:ext>
-              </p:extLst>
-            </p:nvPr>
-          </p:nvCxnSpPr>
-          <p:spPr>
-            <a:xfrm>
-              <a:off x="12185786" y="-1"/>
-              <a:ext cx="0" cy="6858000"/>
-            </a:xfrm>
-            <a:prstGeom prst="line">
-              <a:avLst/>
-            </a:prstGeom>
-            <a:ln w="12700">
-              <a:solidFill>
-                <a:srgbClr val="BCBCBC">
-                  <a:alpha val="29804"/>
-                </a:srgbClr>
-              </a:solidFill>
-              <a:prstDash val="sysDot"/>
-            </a:ln>
-          </p:spPr>
-          <p:style>
-            <a:lnRef idx="1">
-              <a:schemeClr val="accent1"/>
-            </a:lnRef>
-            <a:fillRef idx="0">
-              <a:schemeClr val="accent1"/>
-            </a:fillRef>
-            <a:effectRef idx="0">
-              <a:schemeClr val="accent1"/>
-            </a:effectRef>
-            <a:fontRef idx="minor">
-              <a:schemeClr val="tx1"/>
-            </a:fontRef>
-          </p:style>
-        </p:cxnSp>
-        <p:cxnSp>
-          <p:nvCxnSpPr>
-            <p:cNvPr id="28" name="Straight Connector 27">
-              <a:extLst>
-                <a:ext uri="{FF2B5EF4-FFF2-40B4-BE49-F238E27FC236}">
-                  <a16:creationId xmlns:a16="http://schemas.microsoft.com/office/drawing/2014/main" id="{9F708EBE-3154-4FF4-8E8F-88A076208068}"/>
-                </a:ext>
-                <a:ext uri="{C183D7F6-B498-43B3-948B-1728B52AA6E4}">
-                  <adec:decorative xmlns:adec="http://schemas.microsoft.com/office/drawing/2017/decorative" val="1"/>
-                </a:ext>
-              </a:extLst>
-            </p:cNvPr>
-            <p:cNvCxnSpPr>
-              <a:cxnSpLocks/>
-            </p:cNvCxnSpPr>
-            <p:nvPr>
-              <p:extLst>
-                <p:ext uri="{386F3935-93C4-4BCD-93E2-E3B085C9AB24}">
-                  <p16:designElem xmlns:p16="http://schemas.microsoft.com/office/powerpoint/2015/main" val="1"/>
-                </p:ext>
-              </p:extLst>
-            </p:nvPr>
-          </p:nvCxnSpPr>
-          <p:spPr>
-            <a:xfrm>
-              <a:off x="0" y="171716"/>
-              <a:ext cx="12192000" cy="0"/>
-            </a:xfrm>
-            <a:prstGeom prst="line">
-              <a:avLst/>
-            </a:prstGeom>
-            <a:ln w="12700">
-              <a:solidFill>
-                <a:srgbClr val="BCBCBC">
-                  <a:alpha val="29804"/>
-                </a:srgbClr>
-              </a:solidFill>
-              <a:prstDash val="sysDot"/>
-            </a:ln>
-          </p:spPr>
-          <p:style>
-            <a:lnRef idx="1">
-              <a:schemeClr val="accent1"/>
-            </a:lnRef>
-            <a:fillRef idx="0">
-              <a:schemeClr val="accent1"/>
-            </a:fillRef>
-            <a:effectRef idx="0">
-              <a:schemeClr val="accent1"/>
-            </a:effectRef>
-            <a:fontRef idx="minor">
-              <a:schemeClr val="tx1"/>
-            </a:fontRef>
-          </p:style>
-        </p:cxnSp>
-        <p:cxnSp>
-          <p:nvCxnSpPr>
-            <p:cNvPr id="29" name="Straight Connector 28">
-              <a:extLst>
-                <a:ext uri="{FF2B5EF4-FFF2-40B4-BE49-F238E27FC236}">
-                  <a16:creationId xmlns:a16="http://schemas.microsoft.com/office/drawing/2014/main" id="{27A99B5C-EB03-4D56-8DFE-B006D7081B61}"/>
-                </a:ext>
-                <a:ext uri="{C183D7F6-B498-43B3-948B-1728B52AA6E4}">
-                  <adec:decorative xmlns:adec="http://schemas.microsoft.com/office/drawing/2017/decorative" val="1"/>
-                </a:ext>
-              </a:extLst>
-            </p:cNvPr>
-            <p:cNvCxnSpPr>
-              <a:cxnSpLocks/>
-            </p:cNvCxnSpPr>
-            <p:nvPr>
-              <p:extLst>
-                <p:ext uri="{386F3935-93C4-4BCD-93E2-E3B085C9AB24}">
-                  <p16:designElem xmlns:p16="http://schemas.microsoft.com/office/powerpoint/2015/main" val="1"/>
-                </p:ext>
-              </p:extLst>
-            </p:nvPr>
-          </p:nvCxnSpPr>
-          <p:spPr>
-            <a:xfrm>
-              <a:off x="0" y="714597"/>
-              <a:ext cx="12192000" cy="0"/>
-            </a:xfrm>
-            <a:prstGeom prst="line">
-              <a:avLst/>
-            </a:prstGeom>
-            <a:ln w="12700">
-              <a:solidFill>
-                <a:srgbClr val="BCBCBC">
-                  <a:alpha val="29804"/>
-                </a:srgbClr>
-              </a:solidFill>
-              <a:prstDash val="sysDot"/>
-            </a:ln>
-          </p:spPr>
-          <p:style>
-            <a:lnRef idx="1">
-              <a:schemeClr val="accent1"/>
-            </a:lnRef>
-            <a:fillRef idx="0">
-              <a:schemeClr val="accent1"/>
-            </a:fillRef>
-            <a:effectRef idx="0">
-              <a:schemeClr val="accent1"/>
-            </a:effectRef>
-            <a:fontRef idx="minor">
-              <a:schemeClr val="tx1"/>
-            </a:fontRef>
-          </p:style>
-        </p:cxnSp>
-        <p:cxnSp>
-          <p:nvCxnSpPr>
-            <p:cNvPr id="30" name="Straight Connector 29">
-              <a:extLst>
-                <a:ext uri="{FF2B5EF4-FFF2-40B4-BE49-F238E27FC236}">
-                  <a16:creationId xmlns:a16="http://schemas.microsoft.com/office/drawing/2014/main" id="{2FCBAFF0-9FB4-4160-B9BE-CCBE1D8B8CBD}"/>
-                </a:ext>
-                <a:ext uri="{C183D7F6-B498-43B3-948B-1728B52AA6E4}">
-                  <adec:decorative xmlns:adec="http://schemas.microsoft.com/office/drawing/2017/decorative" val="1"/>
-                </a:ext>
-              </a:extLst>
-            </p:cNvPr>
-            <p:cNvCxnSpPr>
-              <a:cxnSpLocks/>
-            </p:cNvCxnSpPr>
-            <p:nvPr>
-              <p:extLst>
-                <p:ext uri="{386F3935-93C4-4BCD-93E2-E3B085C9AB24}">
-                  <p16:designElem xmlns:p16="http://schemas.microsoft.com/office/powerpoint/2015/main" val="1"/>
-                </p:ext>
-              </p:extLst>
-            </p:nvPr>
-          </p:nvCxnSpPr>
-          <p:spPr>
-            <a:xfrm>
-              <a:off x="0" y="1257478"/>
-              <a:ext cx="12192000" cy="0"/>
-            </a:xfrm>
-            <a:prstGeom prst="line">
-              <a:avLst/>
-            </a:prstGeom>
-            <a:ln w="12700">
-              <a:solidFill>
-                <a:srgbClr val="BCBCBC">
-                  <a:alpha val="29804"/>
-                </a:srgbClr>
-              </a:solidFill>
-              <a:prstDash val="sysDot"/>
-            </a:ln>
-          </p:spPr>
-          <p:style>
-            <a:lnRef idx="1">
-              <a:schemeClr val="accent1"/>
-            </a:lnRef>
-            <a:fillRef idx="0">
-              <a:schemeClr val="accent1"/>
-            </a:fillRef>
-            <a:effectRef idx="0">
-              <a:schemeClr val="accent1"/>
-            </a:effectRef>
-            <a:fontRef idx="minor">
-              <a:schemeClr val="tx1"/>
-            </a:fontRef>
-          </p:style>
-        </p:cxnSp>
-        <p:cxnSp>
-          <p:nvCxnSpPr>
-            <p:cNvPr id="31" name="Straight Connector 30">
-              <a:extLst>
-                <a:ext uri="{FF2B5EF4-FFF2-40B4-BE49-F238E27FC236}">
-                  <a16:creationId xmlns:a16="http://schemas.microsoft.com/office/drawing/2014/main" id="{326953D7-154A-49A4-B2E1-D94D365EC461}"/>
-                </a:ext>
-                <a:ext uri="{C183D7F6-B498-43B3-948B-1728B52AA6E4}">
-                  <adec:decorative xmlns:adec="http://schemas.microsoft.com/office/drawing/2017/decorative" val="1"/>
-                </a:ext>
-              </a:extLst>
-            </p:cNvPr>
-            <p:cNvCxnSpPr>
-              <a:cxnSpLocks/>
-            </p:cNvCxnSpPr>
-            <p:nvPr>
-              <p:extLst>
-                <p:ext uri="{386F3935-93C4-4BCD-93E2-E3B085C9AB24}">
-                  <p16:designElem xmlns:p16="http://schemas.microsoft.com/office/powerpoint/2015/main" val="1"/>
-                </p:ext>
-              </p:extLst>
-            </p:nvPr>
-          </p:nvCxnSpPr>
-          <p:spPr>
-            <a:xfrm>
-              <a:off x="0" y="1800359"/>
-              <a:ext cx="12192000" cy="0"/>
-            </a:xfrm>
-            <a:prstGeom prst="line">
-              <a:avLst/>
-            </a:prstGeom>
-            <a:ln w="12700">
-              <a:solidFill>
-                <a:srgbClr val="BCBCBC">
-                  <a:alpha val="29804"/>
-                </a:srgbClr>
-              </a:solidFill>
-              <a:prstDash val="sysDot"/>
-            </a:ln>
-          </p:spPr>
-          <p:style>
-            <a:lnRef idx="1">
-              <a:schemeClr val="accent1"/>
-            </a:lnRef>
-            <a:fillRef idx="0">
-              <a:schemeClr val="accent1"/>
-            </a:fillRef>
-            <a:effectRef idx="0">
-              <a:schemeClr val="accent1"/>
-            </a:effectRef>
-            <a:fontRef idx="minor">
-              <a:schemeClr val="tx1"/>
-            </a:fontRef>
-          </p:style>
-        </p:cxnSp>
-        <p:cxnSp>
-          <p:nvCxnSpPr>
-            <p:cNvPr id="32" name="Straight Connector 31">
-              <a:extLst>
-                <a:ext uri="{FF2B5EF4-FFF2-40B4-BE49-F238E27FC236}">
-                  <a16:creationId xmlns:a16="http://schemas.microsoft.com/office/drawing/2014/main" id="{836E3E12-5D96-48DB-8320-6294287740AC}"/>
-                </a:ext>
-                <a:ext uri="{C183D7F6-B498-43B3-948B-1728B52AA6E4}">
-                  <adec:decorative xmlns:adec="http://schemas.microsoft.com/office/drawing/2017/decorative" val="1"/>
-                </a:ext>
-              </a:extLst>
-            </p:cNvPr>
-            <p:cNvCxnSpPr>
-              <a:cxnSpLocks/>
-            </p:cNvCxnSpPr>
-            <p:nvPr>
-              <p:extLst>
-                <p:ext uri="{386F3935-93C4-4BCD-93E2-E3B085C9AB24}">
-                  <p16:designElem xmlns:p16="http://schemas.microsoft.com/office/powerpoint/2015/main" val="1"/>
-                </p:ext>
-              </p:extLst>
-            </p:nvPr>
-          </p:nvCxnSpPr>
-          <p:spPr>
-            <a:xfrm>
-              <a:off x="0" y="2343240"/>
-              <a:ext cx="12192000" cy="0"/>
-            </a:xfrm>
-            <a:prstGeom prst="line">
-              <a:avLst/>
-            </a:prstGeom>
-            <a:ln w="12700">
-              <a:solidFill>
-                <a:srgbClr val="BCBCBC">
-                  <a:alpha val="29804"/>
-                </a:srgbClr>
-              </a:solidFill>
-              <a:prstDash val="sysDot"/>
-            </a:ln>
-          </p:spPr>
-          <p:style>
-            <a:lnRef idx="1">
-              <a:schemeClr val="accent1"/>
-            </a:lnRef>
-            <a:fillRef idx="0">
-              <a:schemeClr val="accent1"/>
-            </a:fillRef>
-            <a:effectRef idx="0">
-              <a:schemeClr val="accent1"/>
-            </a:effectRef>
-            <a:fontRef idx="minor">
-              <a:schemeClr val="tx1"/>
-            </a:fontRef>
-          </p:style>
-        </p:cxnSp>
-        <p:cxnSp>
-          <p:nvCxnSpPr>
-            <p:cNvPr id="33" name="Straight Connector 32">
-              <a:extLst>
-                <a:ext uri="{FF2B5EF4-FFF2-40B4-BE49-F238E27FC236}">
-                  <a16:creationId xmlns:a16="http://schemas.microsoft.com/office/drawing/2014/main" id="{7A059482-79BA-4E80-80A2-36FD8408DA34}"/>
-                </a:ext>
-                <a:ext uri="{C183D7F6-B498-43B3-948B-1728B52AA6E4}">
-                  <adec:decorative xmlns:adec="http://schemas.microsoft.com/office/drawing/2017/decorative" val="1"/>
-                </a:ext>
-              </a:extLst>
-            </p:cNvPr>
-            <p:cNvCxnSpPr>
-              <a:cxnSpLocks/>
-            </p:cNvCxnSpPr>
-            <p:nvPr>
-              <p:extLst>
-                <p:ext uri="{386F3935-93C4-4BCD-93E2-E3B085C9AB24}">
-                  <p16:designElem xmlns:p16="http://schemas.microsoft.com/office/powerpoint/2015/main" val="1"/>
-                </p:ext>
-              </p:extLst>
-            </p:nvPr>
-          </p:nvCxnSpPr>
-          <p:spPr>
-            <a:xfrm>
-              <a:off x="0" y="2886121"/>
-              <a:ext cx="12192000" cy="0"/>
-            </a:xfrm>
-            <a:prstGeom prst="line">
-              <a:avLst/>
-            </a:prstGeom>
-            <a:ln w="12700">
-              <a:solidFill>
-                <a:srgbClr val="BCBCBC">
-                  <a:alpha val="29804"/>
-                </a:srgbClr>
-              </a:solidFill>
-              <a:prstDash val="sysDot"/>
-            </a:ln>
-          </p:spPr>
-          <p:style>
-            <a:lnRef idx="1">
-              <a:schemeClr val="accent1"/>
-            </a:lnRef>
-            <a:fillRef idx="0">
-              <a:schemeClr val="accent1"/>
-            </a:fillRef>
-            <a:effectRef idx="0">
-              <a:schemeClr val="accent1"/>
-            </a:effectRef>
-            <a:fontRef idx="minor">
-              <a:schemeClr val="tx1"/>
-            </a:fontRef>
-          </p:style>
-        </p:cxnSp>
-        <p:cxnSp>
-          <p:nvCxnSpPr>
-            <p:cNvPr id="34" name="Straight Connector 33">
-              <a:extLst>
-                <a:ext uri="{FF2B5EF4-FFF2-40B4-BE49-F238E27FC236}">
-                  <a16:creationId xmlns:a16="http://schemas.microsoft.com/office/drawing/2014/main" id="{B4EF88B3-C210-433D-B20D-FE41B4D5F936}"/>
-                </a:ext>
-                <a:ext uri="{C183D7F6-B498-43B3-948B-1728B52AA6E4}">
-                  <adec:decorative xmlns:adec="http://schemas.microsoft.com/office/drawing/2017/decorative" val="1"/>
-                </a:ext>
-              </a:extLst>
-            </p:cNvPr>
-            <p:cNvCxnSpPr>
-              <a:cxnSpLocks/>
-            </p:cNvCxnSpPr>
-            <p:nvPr>
-              <p:extLst>
-                <p:ext uri="{386F3935-93C4-4BCD-93E2-E3B085C9AB24}">
-                  <p16:designElem xmlns:p16="http://schemas.microsoft.com/office/powerpoint/2015/main" val="1"/>
-                </p:ext>
-              </p:extLst>
-            </p:nvPr>
-          </p:nvCxnSpPr>
-          <p:spPr>
-            <a:xfrm>
-              <a:off x="0" y="3429002"/>
-              <a:ext cx="12192000" cy="0"/>
-            </a:xfrm>
-            <a:prstGeom prst="line">
-              <a:avLst/>
-            </a:prstGeom>
-            <a:ln w="12700">
-              <a:solidFill>
-                <a:srgbClr val="BCBCBC">
-                  <a:alpha val="29804"/>
-                </a:srgbClr>
-              </a:solidFill>
-              <a:prstDash val="sysDot"/>
-            </a:ln>
-          </p:spPr>
-          <p:style>
-            <a:lnRef idx="1">
-              <a:schemeClr val="accent1"/>
-            </a:lnRef>
-            <a:fillRef idx="0">
-              <a:schemeClr val="accent1"/>
-            </a:fillRef>
-            <a:effectRef idx="0">
-              <a:schemeClr val="accent1"/>
-            </a:effectRef>
-            <a:fontRef idx="minor">
-              <a:schemeClr val="tx1"/>
-            </a:fontRef>
-          </p:style>
-        </p:cxnSp>
-        <p:cxnSp>
-          <p:nvCxnSpPr>
-            <p:cNvPr id="35" name="Straight Connector 34">
-              <a:extLst>
-                <a:ext uri="{FF2B5EF4-FFF2-40B4-BE49-F238E27FC236}">
-                  <a16:creationId xmlns:a16="http://schemas.microsoft.com/office/drawing/2014/main" id="{53665D3E-61E7-4EDF-A208-56449D765C62}"/>
-                </a:ext>
-                <a:ext uri="{C183D7F6-B498-43B3-948B-1728B52AA6E4}">
-                  <adec:decorative xmlns:adec="http://schemas.microsoft.com/office/drawing/2017/decorative" val="1"/>
-                </a:ext>
-              </a:extLst>
-            </p:cNvPr>
-            <p:cNvCxnSpPr>
-              <a:cxnSpLocks/>
-            </p:cNvCxnSpPr>
-            <p:nvPr>
-              <p:extLst>
-                <p:ext uri="{386F3935-93C4-4BCD-93E2-E3B085C9AB24}">
-                  <p16:designElem xmlns:p16="http://schemas.microsoft.com/office/powerpoint/2015/main" val="1"/>
-                </p:ext>
-              </p:extLst>
-            </p:nvPr>
-          </p:nvCxnSpPr>
-          <p:spPr>
-            <a:xfrm>
-              <a:off x="0" y="3971883"/>
-              <a:ext cx="12192000" cy="0"/>
-            </a:xfrm>
-            <a:prstGeom prst="line">
-              <a:avLst/>
-            </a:prstGeom>
-            <a:ln w="12700">
-              <a:solidFill>
-                <a:srgbClr val="BCBCBC">
-                  <a:alpha val="29804"/>
-                </a:srgbClr>
-              </a:solidFill>
-              <a:prstDash val="sysDot"/>
-            </a:ln>
-          </p:spPr>
-          <p:style>
-            <a:lnRef idx="1">
-              <a:schemeClr val="accent1"/>
-            </a:lnRef>
-            <a:fillRef idx="0">
-              <a:schemeClr val="accent1"/>
-            </a:fillRef>
-            <a:effectRef idx="0">
-              <a:schemeClr val="accent1"/>
-            </a:effectRef>
-            <a:fontRef idx="minor">
-              <a:schemeClr val="tx1"/>
-            </a:fontRef>
-          </p:style>
-        </p:cxnSp>
-        <p:cxnSp>
-          <p:nvCxnSpPr>
-            <p:cNvPr id="36" name="Straight Connector 35">
-              <a:extLst>
-                <a:ext uri="{FF2B5EF4-FFF2-40B4-BE49-F238E27FC236}">
-                  <a16:creationId xmlns:a16="http://schemas.microsoft.com/office/drawing/2014/main" id="{874CF3B0-C9C3-4683-94A3-DC0AE1E74512}"/>
-                </a:ext>
-                <a:ext uri="{C183D7F6-B498-43B3-948B-1728B52AA6E4}">
-                  <adec:decorative xmlns:adec="http://schemas.microsoft.com/office/drawing/2017/decorative" val="1"/>
-                </a:ext>
-              </a:extLst>
-            </p:cNvPr>
-            <p:cNvCxnSpPr>
-              <a:cxnSpLocks/>
-            </p:cNvCxnSpPr>
-            <p:nvPr>
-              <p:extLst>
-                <p:ext uri="{386F3935-93C4-4BCD-93E2-E3B085C9AB24}">
-                  <p16:designElem xmlns:p16="http://schemas.microsoft.com/office/powerpoint/2015/main" val="1"/>
-                </p:ext>
-              </p:extLst>
-            </p:nvPr>
-          </p:nvCxnSpPr>
-          <p:spPr>
-            <a:xfrm>
-              <a:off x="0" y="4514764"/>
-              <a:ext cx="12192000" cy="0"/>
-            </a:xfrm>
-            <a:prstGeom prst="line">
-              <a:avLst/>
-            </a:prstGeom>
-            <a:ln w="12700">
-              <a:solidFill>
-                <a:srgbClr val="BCBCBC">
-                  <a:alpha val="29804"/>
-                </a:srgbClr>
-              </a:solidFill>
-              <a:prstDash val="sysDot"/>
-            </a:ln>
-          </p:spPr>
-          <p:style>
-            <a:lnRef idx="1">
-              <a:schemeClr val="accent1"/>
-            </a:lnRef>
-            <a:fillRef idx="0">
-              <a:schemeClr val="accent1"/>
-            </a:fillRef>
-            <a:effectRef idx="0">
-              <a:schemeClr val="accent1"/>
-            </a:effectRef>
-            <a:fontRef idx="minor">
-              <a:schemeClr val="tx1"/>
-            </a:fontRef>
-          </p:style>
-        </p:cxnSp>
-        <p:cxnSp>
-          <p:nvCxnSpPr>
-            <p:cNvPr id="37" name="Straight Connector 36">
-              <a:extLst>
-                <a:ext uri="{FF2B5EF4-FFF2-40B4-BE49-F238E27FC236}">
-                  <a16:creationId xmlns:a16="http://schemas.microsoft.com/office/drawing/2014/main" id="{7BE90EF9-6DF5-47F4-A069-9F613C81422A}"/>
-                </a:ext>
-                <a:ext uri="{C183D7F6-B498-43B3-948B-1728B52AA6E4}">
-                  <adec:decorative xmlns:adec="http://schemas.microsoft.com/office/drawing/2017/decorative" val="1"/>
-                </a:ext>
-              </a:extLst>
-            </p:cNvPr>
-            <p:cNvCxnSpPr>
-              <a:cxnSpLocks/>
-            </p:cNvCxnSpPr>
-            <p:nvPr>
-              <p:extLst>
-                <p:ext uri="{386F3935-93C4-4BCD-93E2-E3B085C9AB24}">
-                  <p16:designElem xmlns:p16="http://schemas.microsoft.com/office/powerpoint/2015/main" val="1"/>
-                </p:ext>
-              </p:extLst>
-            </p:nvPr>
-          </p:nvCxnSpPr>
-          <p:spPr>
-            <a:xfrm>
-              <a:off x="0" y="5057645"/>
-              <a:ext cx="12192000" cy="0"/>
-            </a:xfrm>
-            <a:prstGeom prst="line">
-              <a:avLst/>
-            </a:prstGeom>
-            <a:ln w="12700">
-              <a:solidFill>
-                <a:srgbClr val="BCBCBC">
-                  <a:alpha val="29804"/>
-                </a:srgbClr>
-              </a:solidFill>
-              <a:prstDash val="sysDot"/>
-            </a:ln>
-          </p:spPr>
-          <p:style>
-            <a:lnRef idx="1">
-              <a:schemeClr val="accent1"/>
-            </a:lnRef>
-            <a:fillRef idx="0">
-              <a:schemeClr val="accent1"/>
-            </a:fillRef>
-            <a:effectRef idx="0">
-              <a:schemeClr val="accent1"/>
-            </a:effectRef>
-            <a:fontRef idx="minor">
-              <a:schemeClr val="tx1"/>
-            </a:fontRef>
-          </p:style>
-        </p:cxnSp>
-        <p:cxnSp>
-          <p:nvCxnSpPr>
-            <p:cNvPr id="38" name="Straight Connector 37">
-              <a:extLst>
-                <a:ext uri="{FF2B5EF4-FFF2-40B4-BE49-F238E27FC236}">
-                  <a16:creationId xmlns:a16="http://schemas.microsoft.com/office/drawing/2014/main" id="{F844EBDE-5A9F-4E9F-8A55-57FB9E979798}"/>
-                </a:ext>
-                <a:ext uri="{C183D7F6-B498-43B3-948B-1728B52AA6E4}">
-                  <adec:decorative xmlns:adec="http://schemas.microsoft.com/office/drawing/2017/decorative" val="1"/>
-                </a:ext>
-              </a:extLst>
-            </p:cNvPr>
-            <p:cNvCxnSpPr>
-              <a:cxnSpLocks/>
-            </p:cNvCxnSpPr>
-            <p:nvPr>
-              <p:extLst>
-                <p:ext uri="{386F3935-93C4-4BCD-93E2-E3B085C9AB24}">
-                  <p16:designElem xmlns:p16="http://schemas.microsoft.com/office/powerpoint/2015/main" val="1"/>
-                </p:ext>
-              </p:extLst>
-            </p:nvPr>
-          </p:nvCxnSpPr>
-          <p:spPr>
-            <a:xfrm>
-              <a:off x="0" y="5600526"/>
-              <a:ext cx="12192000" cy="0"/>
-            </a:xfrm>
-            <a:prstGeom prst="line">
-              <a:avLst/>
-            </a:prstGeom>
-            <a:ln w="12700">
-              <a:solidFill>
-                <a:srgbClr val="BCBCBC">
-                  <a:alpha val="29804"/>
-                </a:srgbClr>
-              </a:solidFill>
-              <a:prstDash val="sysDot"/>
-            </a:ln>
-          </p:spPr>
-          <p:style>
-            <a:lnRef idx="1">
-              <a:schemeClr val="accent1"/>
-            </a:lnRef>
-            <a:fillRef idx="0">
-              <a:schemeClr val="accent1"/>
-            </a:fillRef>
-            <a:effectRef idx="0">
-              <a:schemeClr val="accent1"/>
-            </a:effectRef>
-            <a:fontRef idx="minor">
-              <a:schemeClr val="tx1"/>
-            </a:fontRef>
-          </p:style>
-        </p:cxnSp>
-        <p:cxnSp>
-          <p:nvCxnSpPr>
-            <p:cNvPr id="39" name="Straight Connector 38">
-              <a:extLst>
-                <a:ext uri="{FF2B5EF4-FFF2-40B4-BE49-F238E27FC236}">
-                  <a16:creationId xmlns:a16="http://schemas.microsoft.com/office/drawing/2014/main" id="{6491FC45-82C4-40CD-8D0C-0A2F86E8A1EE}"/>
-                </a:ext>
-                <a:ext uri="{C183D7F6-B498-43B3-948B-1728B52AA6E4}">
-                  <adec:decorative xmlns:adec="http://schemas.microsoft.com/office/drawing/2017/decorative" val="1"/>
-                </a:ext>
-              </a:extLst>
-            </p:cNvPr>
-            <p:cNvCxnSpPr>
-              <a:cxnSpLocks/>
-            </p:cNvCxnSpPr>
-            <p:nvPr>
-              <p:extLst>
-                <p:ext uri="{386F3935-93C4-4BCD-93E2-E3B085C9AB24}">
-                  <p16:designElem xmlns:p16="http://schemas.microsoft.com/office/powerpoint/2015/main" val="1"/>
-                </p:ext>
-              </p:extLst>
-            </p:nvPr>
-          </p:nvCxnSpPr>
-          <p:spPr>
-            <a:xfrm>
-              <a:off x="0" y="6857999"/>
-              <a:ext cx="12192000" cy="0"/>
-            </a:xfrm>
-            <a:prstGeom prst="line">
-              <a:avLst/>
-            </a:prstGeom>
-            <a:ln w="12700">
-              <a:solidFill>
-                <a:srgbClr val="BCBCBC">
-                  <a:alpha val="29804"/>
-                </a:srgbClr>
-              </a:solidFill>
-              <a:prstDash val="sysDot"/>
-            </a:ln>
-          </p:spPr>
-          <p:style>
-            <a:lnRef idx="1">
-              <a:schemeClr val="accent1"/>
-            </a:lnRef>
-            <a:fillRef idx="0">
-              <a:schemeClr val="accent1"/>
-            </a:fillRef>
-            <a:effectRef idx="0">
-              <a:schemeClr val="accent1"/>
-            </a:effectRef>
-            <a:fontRef idx="minor">
-              <a:schemeClr val="tx1"/>
-            </a:fontRef>
-          </p:style>
-        </p:cxnSp>
-        <p:cxnSp>
-          <p:nvCxnSpPr>
-            <p:cNvPr id="40" name="Straight Connector 39">
-              <a:extLst>
-                <a:ext uri="{FF2B5EF4-FFF2-40B4-BE49-F238E27FC236}">
-                  <a16:creationId xmlns:a16="http://schemas.microsoft.com/office/drawing/2014/main" id="{71AD0FE3-6144-4171-943E-0E65D08E806C}"/>
-                </a:ext>
-                <a:ext uri="{C183D7F6-B498-43B3-948B-1728B52AA6E4}">
-                  <adec:decorative xmlns:adec="http://schemas.microsoft.com/office/drawing/2017/decorative" val="1"/>
-                </a:ext>
-              </a:extLst>
-            </p:cNvPr>
-            <p:cNvCxnSpPr>
-              <a:cxnSpLocks/>
-            </p:cNvCxnSpPr>
-            <p:nvPr>
-              <p:extLst>
-                <p:ext uri="{386F3935-93C4-4BCD-93E2-E3B085C9AB24}">
-                  <p16:designElem xmlns:p16="http://schemas.microsoft.com/office/powerpoint/2015/main" val="1"/>
-                </p:ext>
-              </p:extLst>
-            </p:nvPr>
-          </p:nvCxnSpPr>
-          <p:spPr>
-            <a:xfrm>
-              <a:off x="16613" y="6143407"/>
-              <a:ext cx="12192000" cy="0"/>
-            </a:xfrm>
-            <a:prstGeom prst="line">
-              <a:avLst/>
-            </a:prstGeom>
-            <a:ln w="12700">
-              <a:solidFill>
-                <a:srgbClr val="BCBCBC">
-                  <a:alpha val="29804"/>
-                </a:srgbClr>
-              </a:solidFill>
-              <a:prstDash val="sysDot"/>
-            </a:ln>
-          </p:spPr>
-          <p:style>
-            <a:lnRef idx="1">
-              <a:schemeClr val="accent1"/>
-            </a:lnRef>
-            <a:fillRef idx="0">
-              <a:schemeClr val="accent1"/>
-            </a:fillRef>
-            <a:effectRef idx="0">
-              <a:schemeClr val="accent1"/>
-            </a:effectRef>
-            <a:fontRef idx="minor">
-              <a:schemeClr val="tx1"/>
-            </a:fontRef>
-          </p:style>
-        </p:cxnSp>
-        <p:cxnSp>
-          <p:nvCxnSpPr>
-            <p:cNvPr id="41" name="Straight Connector 40">
-              <a:extLst>
-                <a:ext uri="{FF2B5EF4-FFF2-40B4-BE49-F238E27FC236}">
-                  <a16:creationId xmlns:a16="http://schemas.microsoft.com/office/drawing/2014/main" id="{A7BA4499-5E6A-4998-A0F4-614E65552B8C}"/>
-                </a:ext>
-                <a:ext uri="{C183D7F6-B498-43B3-948B-1728B52AA6E4}">
-                  <adec:decorative xmlns:adec="http://schemas.microsoft.com/office/drawing/2017/decorative" val="1"/>
-                </a:ext>
-              </a:extLst>
-            </p:cNvPr>
-            <p:cNvCxnSpPr>
-              <a:cxnSpLocks/>
-            </p:cNvCxnSpPr>
-            <p:nvPr>
-              <p:extLst>
-                <p:ext uri="{386F3935-93C4-4BCD-93E2-E3B085C9AB24}">
-                  <p16:designElem xmlns:p16="http://schemas.microsoft.com/office/powerpoint/2015/main" val="1"/>
-                </p:ext>
-              </p:extLst>
-            </p:nvPr>
-          </p:nvCxnSpPr>
-          <p:spPr>
-            <a:xfrm>
-              <a:off x="684225" y="171716"/>
-              <a:ext cx="0" cy="6511464"/>
-            </a:xfrm>
-            <a:prstGeom prst="line">
-              <a:avLst/>
-            </a:prstGeom>
-            <a:ln w="12700">
-              <a:solidFill>
-                <a:srgbClr val="BCBCBC">
-                  <a:alpha val="29804"/>
-                </a:srgbClr>
-              </a:solidFill>
-              <a:prstDash val="sysDot"/>
-            </a:ln>
-          </p:spPr>
-          <p:style>
-            <a:lnRef idx="1">
-              <a:schemeClr val="accent1"/>
-            </a:lnRef>
-            <a:fillRef idx="0">
-              <a:schemeClr val="accent1"/>
-            </a:fillRef>
-            <a:effectRef idx="0">
-              <a:schemeClr val="accent1"/>
-            </a:effectRef>
-            <a:fontRef idx="minor">
-              <a:schemeClr val="tx1"/>
-            </a:fontRef>
-          </p:style>
-        </p:cxnSp>
-        <p:cxnSp>
-          <p:nvCxnSpPr>
-            <p:cNvPr id="42" name="Straight Connector 41">
-              <a:extLst>
-                <a:ext uri="{FF2B5EF4-FFF2-40B4-BE49-F238E27FC236}">
-                  <a16:creationId xmlns:a16="http://schemas.microsoft.com/office/drawing/2014/main" id="{CAFE7A6F-A7F0-4406-809F-E23FCB201E3B}"/>
-                </a:ext>
-                <a:ext uri="{C183D7F6-B498-43B3-948B-1728B52AA6E4}">
-                  <adec:decorative xmlns:adec="http://schemas.microsoft.com/office/drawing/2017/decorative" val="1"/>
-                </a:ext>
-              </a:extLst>
-            </p:cNvPr>
-            <p:cNvCxnSpPr>
-              <a:cxnSpLocks/>
-            </p:cNvCxnSpPr>
-            <p:nvPr>
-              <p:extLst>
-                <p:ext uri="{386F3935-93C4-4BCD-93E2-E3B085C9AB24}">
-                  <p16:designElem xmlns:p16="http://schemas.microsoft.com/office/powerpoint/2015/main" val="1"/>
-                </p:ext>
-              </p:extLst>
-            </p:nvPr>
-          </p:nvCxnSpPr>
-          <p:spPr>
-            <a:xfrm>
-              <a:off x="11508412" y="173267"/>
-              <a:ext cx="0" cy="6511464"/>
-            </a:xfrm>
-            <a:prstGeom prst="line">
-              <a:avLst/>
-            </a:prstGeom>
-            <a:ln w="12700">
-              <a:solidFill>
-                <a:srgbClr val="BCBCBC">
-                  <a:alpha val="29804"/>
-                </a:srgbClr>
-              </a:solidFill>
-              <a:prstDash val="sysDot"/>
-            </a:ln>
-          </p:spPr>
-          <p:style>
-            <a:lnRef idx="1">
-              <a:schemeClr val="accent1"/>
-            </a:lnRef>
-            <a:fillRef idx="0">
-              <a:schemeClr val="accent1"/>
-            </a:fillRef>
-            <a:effectRef idx="0">
-              <a:schemeClr val="accent1"/>
-            </a:effectRef>
-            <a:fontRef idx="minor">
-              <a:schemeClr val="tx1"/>
-            </a:fontRef>
-          </p:style>
-        </p:cxnSp>
-      </p:grpSp>
-      <p:sp>
-        <p:nvSpPr>
-          <p:cNvPr id="2" name="Título 1">
-            <a:extLst>
-              <a:ext uri="{FF2B5EF4-FFF2-40B4-BE49-F238E27FC236}">
-                <a16:creationId xmlns:a16="http://schemas.microsoft.com/office/drawing/2014/main" id="{907DFE90-C241-CE5A-2785-B1C467D5769A}"/>
-              </a:ext>
-            </a:extLst>
-          </p:cNvPr>
-          <p:cNvSpPr>
-            <a:spLocks noGrp="1"/>
-          </p:cNvSpPr>
-          <p:nvPr>
-            <p:ph type="title"/>
-          </p:nvPr>
-        </p:nvSpPr>
-        <p:spPr>
-          <a:xfrm>
-            <a:off x="6088653" y="725951"/>
-            <a:ext cx="4927425" cy="1938525"/>
-          </a:xfrm>
-        </p:spPr>
-        <p:txBody>
-          <a:bodyPr>
-            <a:normAutofit/>
-          </a:bodyPr>
-          <a:lstStyle/>
-          <a:p>
-            <a:r>
-              <a:rPr lang="pt-BR" dirty="0"/>
-              <a:t>Método utilizado para os dados</a:t>
-            </a:r>
-          </a:p>
-        </p:txBody>
-      </p:sp>
-      <p:pic>
-        <p:nvPicPr>
-          <p:cNvPr id="48" name="Picture 4" descr="Gráficos financeiros em uma tela escura">
-            <a:extLst>
-              <a:ext uri="{FF2B5EF4-FFF2-40B4-BE49-F238E27FC236}">
-                <a16:creationId xmlns:a16="http://schemas.microsoft.com/office/drawing/2014/main" id="{A70FCE05-8874-50C3-55EF-1E8A90AC5AE1}"/>
-              </a:ext>
-            </a:extLst>
-          </p:cNvPr>
-          <p:cNvPicPr>
-            <a:picLocks noChangeAspect="1"/>
-          </p:cNvPicPr>
-          <p:nvPr/>
-        </p:nvPicPr>
-        <p:blipFill rotWithShape="1">
-          <a:blip r:embed="rId2"/>
-          <a:srcRect l="20417" r="26225"/>
-          <a:stretch/>
-        </p:blipFill>
-        <p:spPr>
-          <a:xfrm>
-            <a:off x="1" y="10"/>
-            <a:ext cx="5854890" cy="6857990"/>
-          </a:xfrm>
-          <a:custGeom>
-            <a:avLst/>
-            <a:gdLst/>
-            <a:ahLst/>
-            <a:cxnLst/>
-            <a:rect l="l" t="t" r="r" b="b"/>
-            <a:pathLst>
-              <a:path w="6036633" h="6858000">
-                <a:moveTo>
-                  <a:pt x="0" y="0"/>
-                </a:moveTo>
-                <a:lnTo>
-                  <a:pt x="5782584" y="0"/>
-                </a:lnTo>
-                <a:lnTo>
-                  <a:pt x="5847735" y="280891"/>
-                </a:lnTo>
-                <a:cubicBezTo>
-                  <a:pt x="6512611" y="3337011"/>
-                  <a:pt x="5215360" y="3533975"/>
-                  <a:pt x="5130974" y="6590095"/>
-                </a:cubicBezTo>
-                <a:lnTo>
-                  <a:pt x="5127340" y="6858000"/>
-                </a:lnTo>
-                <a:lnTo>
-                  <a:pt x="0" y="6858000"/>
-                </a:lnTo>
-                <a:close/>
-              </a:path>
-            </a:pathLst>
-          </a:custGeom>
-        </p:spPr>
-      </p:pic>
-      <p:sp>
-        <p:nvSpPr>
-          <p:cNvPr id="49" name="Right Triangle 43">
-            <a:extLst>
-              <a:ext uri="{FF2B5EF4-FFF2-40B4-BE49-F238E27FC236}">
-                <a16:creationId xmlns:a16="http://schemas.microsoft.com/office/drawing/2014/main" id="{BEAC0A80-07D3-49CB-87C3-BC34F219DFF7}"/>
-              </a:ext>
-              <a:ext uri="{C183D7F6-B498-43B3-948B-1728B52AA6E4}">
-                <adec:decorative xmlns:adec="http://schemas.microsoft.com/office/drawing/2017/decorative" val="1"/>
-              </a:ext>
-            </a:extLst>
-          </p:cNvPr>
-          <p:cNvSpPr>
-            <a:spLocks noGrp="1" noRot="1" noChangeAspect="1" noMove="1" noResize="1" noEditPoints="1" noAdjustHandles="1" noChangeArrowheads="1" noChangeShapeType="1" noTextEdit="1"/>
-          </p:cNvSpPr>
-          <p:nvPr>
-            <p:extLst>
-              <p:ext uri="{386F3935-93C4-4BCD-93E2-E3B085C9AB24}">
-                <p16:designElem xmlns:p16="http://schemas.microsoft.com/office/powerpoint/2015/main" val="1"/>
-              </p:ext>
-            </p:extLst>
-          </p:nvPr>
-        </p:nvSpPr>
-        <p:spPr>
-          <a:xfrm rot="18900000">
-            <a:off x="6297339" y="-292624"/>
-            <a:ext cx="568289" cy="568289"/>
-          </a:xfrm>
-          <a:prstGeom prst="rtTriangle">
-            <a:avLst/>
-          </a:prstGeom>
-          <a:solidFill>
-            <a:schemeClr val="accent1">
-              <a:alpha val="50000"/>
-            </a:schemeClr>
-          </a:solidFill>
-          <a:ln>
-            <a:noFill/>
-          </a:ln>
-        </p:spPr>
-        <p:style>
-          <a:lnRef idx="2">
-            <a:schemeClr val="accent1">
-              <a:shade val="50000"/>
-            </a:schemeClr>
-          </a:lnRef>
-          <a:fillRef idx="1">
-            <a:schemeClr val="accent1"/>
-          </a:fillRef>
-          <a:effectRef idx="0">
-            <a:schemeClr val="accent1"/>
-          </a:effectRef>
-          <a:fontRef idx="minor">
-            <a:schemeClr val="lt1"/>
-          </a:fontRef>
-        </p:style>
-        <p:txBody>
-          <a:bodyPr rtlCol="0" anchor="ctr"/>
-          <a:lstStyle/>
-          <a:p>
-            <a:pPr algn="ctr"/>
-            <a:endParaRPr lang="en-US">
-              <a:solidFill>
-                <a:schemeClr val="tx1"/>
-              </a:solidFill>
-            </a:endParaRPr>
-          </a:p>
-        </p:txBody>
-      </p:sp>
-      <p:sp>
-        <p:nvSpPr>
-          <p:cNvPr id="3" name="Espaço Reservado para Conteúdo 2">
-            <a:extLst>
-              <a:ext uri="{FF2B5EF4-FFF2-40B4-BE49-F238E27FC236}">
-                <a16:creationId xmlns:a16="http://schemas.microsoft.com/office/drawing/2014/main" id="{CF427797-2CD8-578C-7494-8399C0518688}"/>
-              </a:ext>
-            </a:extLst>
-          </p:cNvPr>
-          <p:cNvSpPr>
-            <a:spLocks noGrp="1"/>
-          </p:cNvSpPr>
-          <p:nvPr>
-            <p:ph idx="1"/>
-          </p:nvPr>
-        </p:nvSpPr>
-        <p:spPr>
-          <a:xfrm>
-            <a:off x="6088653" y="2886116"/>
-            <a:ext cx="4927425" cy="3245931"/>
-          </a:xfrm>
-        </p:spPr>
-        <p:txBody>
-          <a:bodyPr>
-            <a:normAutofit/>
-          </a:bodyPr>
-          <a:lstStyle/>
-          <a:p>
-            <a:pPr marL="0" indent="0">
-              <a:lnSpc>
-                <a:spcPct val="100000"/>
-              </a:lnSpc>
-              <a:buNone/>
-            </a:pPr>
-            <a:r>
-              <a:rPr lang="pt-BR" sz="1700" dirty="0"/>
-              <a:t>Sabemos que muitas pessoas no Brasil foram infectadas pelo vírus do corona, mas talvez muita gente não saiba qual locais houveram mais infecções. Diante disso criamos uma tabela fato que mostra ordenadamente pela total de casos confirmados em determinada cidade, junto com o estado, a data inicial que começou, a data final do último resultado coletado, além dos totais de mortes e a média dos casos confirmados por 100 mil habitantes</a:t>
-            </a:r>
-          </a:p>
-        </p:txBody>
-      </p:sp>
-    </p:spTree>
-    <p:extLst>
-      <p:ext uri="{BB962C8B-B14F-4D97-AF65-F5344CB8AC3E}">
-        <p14:creationId xmlns:p14="http://schemas.microsoft.com/office/powerpoint/2010/main" val="426408020"/>
       </p:ext>
     </p:extLst>
   </p:cSld>
@@ -38143,15 +38143,6 @@
 </file>
 
 <file path=customXml/item1.xml><?xml version="1.0" encoding="utf-8"?>
-<?mso-contentType ?>
-<FormTemplates xmlns="http://schemas.microsoft.com/sharepoint/v3/contenttype/forms">
-  <Display>DocumentLibraryForm</Display>
-  <Edit>DocumentLibraryForm</Edit>
-  <New>DocumentLibraryForm</New>
-</FormTemplates>
-</file>
-
-<file path=customXml/item2.xml><?xml version="1.0" encoding="utf-8"?>
 <ct:contentTypeSchema xmlns:ct="http://schemas.microsoft.com/office/2006/metadata/contentType" xmlns:ma="http://schemas.microsoft.com/office/2006/metadata/properties/metaAttributes" ct:_="" ma:_="" ma:contentTypeName="Document" ma:contentTypeID="0x010100A5996B5EC4F46F47974B5FD75DD09DAB" ma:contentTypeVersion="12" ma:contentTypeDescription="Create a new document." ma:contentTypeScope="" ma:versionID="ff80896e4b490547d8dec9eb78fe0cbf">
   <xsd:schema xmlns:xsd="http://www.w3.org/2001/XMLSchema" xmlns:xs="http://www.w3.org/2001/XMLSchema" xmlns:p="http://schemas.microsoft.com/office/2006/metadata/properties" xmlns:ns3="c93dbd37-5c80-4085-9a06-fbc464e41561" xmlns:ns4="270dfcfb-63c0-4a9f-b1f3-81c320894128" targetNamespace="http://schemas.microsoft.com/office/2006/metadata/properties" ma:root="true" ma:fieldsID="6baefc9451650149e4ebba237c1da01a" ns3:_="" ns4:_="">
     <xsd:import namespace="c93dbd37-5c80-4085-9a06-fbc464e41561"/>
@@ -38366,7 +38357,7 @@
 </ct:contentTypeSchema>
 </file>
 
-<file path=customXml/item3.xml><?xml version="1.0" encoding="utf-8"?>
+<file path=customXml/item2.xml><?xml version="1.0" encoding="utf-8"?>
 <p:properties xmlns:p="http://schemas.microsoft.com/office/2006/metadata/properties" xmlns:xsi="http://www.w3.org/2001/XMLSchema-instance" xmlns:pc="http://schemas.microsoft.com/office/infopath/2007/PartnerControls">
   <documentManagement>
     <_activity xmlns="c93dbd37-5c80-4085-9a06-fbc464e41561" xsi:nil="true"/>
@@ -38374,15 +38365,16 @@
 </p:properties>
 </file>
 
-<file path=customXml/itemProps1.xml><?xml version="1.0" encoding="utf-8"?>
-<ds:datastoreItem xmlns:ds="http://schemas.openxmlformats.org/officeDocument/2006/customXml" ds:itemID="{0880503C-C8EB-4BCC-B784-ACA962256BFC}">
-  <ds:schemaRefs>
-    <ds:schemaRef ds:uri="http://schemas.microsoft.com/sharepoint/v3/contenttype/forms"/>
-  </ds:schemaRefs>
-</ds:datastoreItem>
+<file path=customXml/item3.xml><?xml version="1.0" encoding="utf-8"?>
+<?mso-contentType ?>
+<FormTemplates xmlns="http://schemas.microsoft.com/sharepoint/v3/contenttype/forms">
+  <Display>DocumentLibraryForm</Display>
+  <Edit>DocumentLibraryForm</Edit>
+  <New>DocumentLibraryForm</New>
+</FormTemplates>
 </file>
 
-<file path=customXml/itemProps2.xml><?xml version="1.0" encoding="utf-8"?>
+<file path=customXml/itemProps1.xml><?xml version="1.0" encoding="utf-8"?>
 <ds:datastoreItem xmlns:ds="http://schemas.openxmlformats.org/officeDocument/2006/customXml" ds:itemID="{DEC48CC2-8C14-4FA2-B312-C07CD8E01D48}">
   <ds:schemaRefs>
     <ds:schemaRef ds:uri="http://schemas.microsoft.com/office/2006/metadata/contentType"/>
@@ -38401,7 +38393,7 @@
 </ds:datastoreItem>
 </file>
 
-<file path=customXml/itemProps3.xml><?xml version="1.0" encoding="utf-8"?>
+<file path=customXml/itemProps2.xml><?xml version="1.0" encoding="utf-8"?>
 <ds:datastoreItem xmlns:ds="http://schemas.openxmlformats.org/officeDocument/2006/customXml" ds:itemID="{3CBB4D27-4061-4F7C-ACEA-821DF1ECFA3B}">
   <ds:schemaRefs>
     <ds:schemaRef ds:uri="http://purl.org/dc/terms/"/>
@@ -38416,4 +38408,12 @@
     <ds:schemaRef ds:uri="http://purl.org/dc/dcmitype/"/>
   </ds:schemaRefs>
 </ds:datastoreItem>
+</file>
+
+<file path=customXml/itemProps3.xml><?xml version="1.0" encoding="utf-8"?>
+<ds:datastoreItem xmlns:ds="http://schemas.openxmlformats.org/officeDocument/2006/customXml" ds:itemID="{0880503C-C8EB-4BCC-B784-ACA962256BFC}">
+  <ds:schemaRefs>
+    <ds:schemaRef ds:uri="http://schemas.microsoft.com/sharepoint/v3/contenttype/forms"/>
+  </ds:schemaRefs>
+</ds:datastoreItem>
 </file>
</xml_diff>